<commit_message>
presentation changes after m-meeting
</commit_message>
<xml_diff>
--- a/Capstone3Presentation.pptx
+++ b/Capstone3Presentation.pptx
@@ -20,18 +20,19 @@
     <p:sldId id="265" r:id="rId16"/>
     <p:sldId id="266" r:id="rId17"/>
     <p:sldId id="267" r:id="rId18"/>
+    <p:sldId id="268" r:id="rId19"/>
   </p:sldIdLst>
   <p:sldSz cy="5143500" cx="9144000"/>
   <p:notesSz cx="6858000" cy="9144000"/>
   <p:embeddedFontLst>
     <p:embeddedFont>
       <p:font typeface="Average"/>
-      <p:regular r:id="rId19"/>
+      <p:regular r:id="rId20"/>
     </p:embeddedFont>
     <p:embeddedFont>
       <p:font typeface="Oswald"/>
-      <p:regular r:id="rId20"/>
-      <p:bold r:id="rId21"/>
+      <p:regular r:id="rId21"/>
+      <p:bold r:id="rId22"/>
     </p:embeddedFont>
   </p:embeddedFontLst>
   <p:defaultTextStyle>
@@ -826,7 +827,7 @@
       </p:grpSpPr>
       <p:sp>
         <p:nvSpPr>
-          <p:cNvPr id="116" name="Google Shape;116;g28bbcec5e1e_0_36:notes"/>
+          <p:cNvPr id="116" name="Google Shape;116;g24dba192ec1_0_17:notes"/>
           <p:cNvSpPr/>
           <p:nvPr>
             <p:ph idx="2" type="sldImg"/>
@@ -861,7 +862,7 @@
       </p:sp>
       <p:sp>
         <p:nvSpPr>
-          <p:cNvPr id="117" name="Google Shape;117;g28bbcec5e1e_0_36:notes"/>
+          <p:cNvPr id="117" name="Google Shape;117;g24dba192ec1_0_17:notes"/>
           <p:cNvSpPr txBox="1"/>
           <p:nvPr>
             <p:ph idx="1" type="body"/>
@@ -893,7 +894,47 @@
             </a:pPr>
             <a:r>
               <a:rPr lang="en"/>
-              <a:t>Looks more like SARIMA and doesn’t match actual glucose during first 2 hours as well as TCN with just carbs.</a:t>
+              <a:t>SARIMAX with same model order determined for ARIMA. </a:t>
+            </a:r>
+            <a:r>
+              <a:rPr lang="en">
+                <a:solidFill>
+                  <a:schemeClr val="dk1"/>
+                </a:solidFill>
+              </a:rPr>
+              <a:t>(Is this the right approach? Try using covars when finding order.)</a:t>
+            </a:r>
+            <a:endParaRPr/>
+          </a:p>
+          <a:p>
+            <a:pPr indent="0" lvl="0" marL="0" rtl="0" algn="l">
+              <a:spcBef>
+                <a:spcPts val="0"/>
+              </a:spcBef>
+              <a:spcAft>
+                <a:spcPts val="0"/>
+              </a:spcAft>
+              <a:buNone/>
+            </a:pPr>
+            <a:r>
+              <a:rPr lang="en"/>
+              <a:t>Last four hours are forecast using future covariates,</a:t>
+            </a:r>
+            <a:endParaRPr/>
+          </a:p>
+          <a:p>
+            <a:pPr indent="0" lvl="0" marL="0" rtl="0" algn="l">
+              <a:spcBef>
+                <a:spcPts val="0"/>
+              </a:spcBef>
+              <a:spcAft>
+                <a:spcPts val="0"/>
+              </a:spcAft>
+              <a:buNone/>
+            </a:pPr>
+            <a:r>
+              <a:rPr lang="en"/>
+              <a:t>remainder is one-step-ahead forecast.</a:t>
             </a:r>
             <a:endParaRPr/>
           </a:p>
@@ -912,7 +953,7 @@
   <p:cSld>
     <p:spTree>
       <p:nvGrpSpPr>
-        <p:cNvPr id="122" name="Shape 122"/>
+        <p:cNvPr id="121" name="Shape 121"/>
         <p:cNvGrpSpPr/>
         <p:nvPr/>
       </p:nvGrpSpPr>
@@ -926,7 +967,7 @@
       </p:grpSpPr>
       <p:sp>
         <p:nvSpPr>
-          <p:cNvPr id="123" name="Google Shape;123;g23bb241f12c_0_538:notes"/>
+          <p:cNvPr id="122" name="Google Shape;122;g28bbcec5e1e_0_36:notes"/>
           <p:cNvSpPr/>
           <p:nvPr>
             <p:ph idx="2" type="sldImg"/>
@@ -961,7 +1002,7 @@
       </p:sp>
       <p:sp>
         <p:nvSpPr>
-          <p:cNvPr id="124" name="Google Shape;124;g23bb241f12c_0_538:notes"/>
+          <p:cNvPr id="123" name="Google Shape;123;g28bbcec5e1e_0_36:notes"/>
           <p:cNvSpPr txBox="1"/>
           <p:nvPr>
             <p:ph idx="1" type="body"/>
@@ -993,47 +1034,7 @@
             </a:pPr>
             <a:r>
               <a:rPr lang="en"/>
-              <a:t>Forecast horizon: Try 30 minute intervals (requires only 8 steps)</a:t>
-            </a:r>
-            <a:endParaRPr/>
-          </a:p>
-          <a:p>
-            <a:pPr indent="0" lvl="0" marL="0" rtl="0" algn="l">
-              <a:spcBef>
-                <a:spcPts val="0"/>
-              </a:spcBef>
-              <a:spcAft>
-                <a:spcPts val="0"/>
-              </a:spcAft>
-              <a:buNone/>
-            </a:pPr>
-            <a:r>
-              <a:rPr lang="en"/>
-              <a:t>Tune parameters: try cross validation tools</a:t>
-            </a:r>
-            <a:endParaRPr/>
-          </a:p>
-          <a:p>
-            <a:pPr indent="0" lvl="0" marL="0" rtl="0" algn="l">
-              <a:spcBef>
-                <a:spcPts val="0"/>
-              </a:spcBef>
-              <a:spcAft>
-                <a:spcPts val="0"/>
-              </a:spcAft>
-              <a:buNone/>
-            </a:pPr>
-            <a:r>
-              <a:rPr lang="en"/>
-              <a:t>TFT borrows </a:t>
-            </a:r>
-            <a:r>
-              <a:rPr lang="en"/>
-              <a:t>concepts</a:t>
-            </a:r>
-            <a:r>
-              <a:rPr lang="en"/>
-              <a:t> from Transformers for learning short and long term dependencies; it supports multi-horizon forecasts, future and past covariates</a:t>
+              <a:t>Looks more like SARIMA and doesn’t match actual glucose during first 2 hours as well as TCN with just carbs.</a:t>
             </a:r>
             <a:endParaRPr/>
           </a:p>
@@ -1066,7 +1067,7 @@
       </p:grpSpPr>
       <p:sp>
         <p:nvSpPr>
-          <p:cNvPr id="129" name="Google Shape;129;g28bbcec5e1e_0_20:notes"/>
+          <p:cNvPr id="129" name="Google Shape;129;g24dba192ec1_0_30:notes"/>
           <p:cNvSpPr/>
           <p:nvPr>
             <p:ph idx="2" type="sldImg"/>
@@ -1101,7 +1102,7 @@
       </p:sp>
       <p:sp>
         <p:nvSpPr>
-          <p:cNvPr id="130" name="Google Shape;130;g28bbcec5e1e_0_20:notes"/>
+          <p:cNvPr id="130" name="Google Shape;130;g24dba192ec1_0_30:notes"/>
           <p:cNvSpPr txBox="1"/>
           <p:nvPr>
             <p:ph idx="1" type="body"/>
@@ -1133,6 +1134,146 @@
             </a:pPr>
             <a:r>
               <a:t/>
+            </a:r>
+            <a:endParaRPr/>
+          </a:p>
+        </p:txBody>
+      </p:sp>
+    </p:spTree>
+  </p:cSld>
+  <p:clrMapOvr>
+    <a:masterClrMapping/>
+  </p:clrMapOvr>
+</p:notes>
+</file>
+
+<file path=ppt/notesSlides/notesSlide13.xml><?xml version="1.0" encoding="utf-8"?>
+<p:notes xmlns:a="http://schemas.openxmlformats.org/drawingml/2006/main" xmlns:r="http://schemas.openxmlformats.org/officeDocument/2006/relationships" xmlns:mc="http://schemas.openxmlformats.org/markup-compatibility/2006" xmlns:mv="urn:schemas-microsoft-com:mac:vml" xmlns:p="http://schemas.openxmlformats.org/presentationml/2006/main" xmlns:c="http://schemas.openxmlformats.org/drawingml/2006/chart" xmlns:dgm="http://schemas.openxmlformats.org/drawingml/2006/diagram" xmlns:o="urn:schemas-microsoft-com:office:office" xmlns:v="urn:schemas-microsoft-com:vml" xmlns:pvml="urn:schemas-microsoft-com:office:powerpoint" xmlns:com="http://schemas.openxmlformats.org/drawingml/2006/compatibility" xmlns:p14="http://schemas.microsoft.com/office/powerpoint/2010/main" xmlns:p15="http://schemas.microsoft.com/office/powerpoint/2012/main" xmlns:ahyp="http://schemas.microsoft.com/office/drawing/2018/hyperlinkcolor" showMasterPhAnim="0" showMasterSp="0">
+  <p:cSld>
+    <p:spTree>
+      <p:nvGrpSpPr>
+        <p:cNvPr id="134" name="Shape 134"/>
+        <p:cNvGrpSpPr/>
+        <p:nvPr/>
+      </p:nvGrpSpPr>
+      <p:grpSpPr>
+        <a:xfrm>
+          <a:off x="0" y="0"/>
+          <a:ext cx="0" cy="0"/>
+          <a:chOff x="0" y="0"/>
+          <a:chExt cx="0" cy="0"/>
+        </a:xfrm>
+      </p:grpSpPr>
+      <p:sp>
+        <p:nvSpPr>
+          <p:cNvPr id="135" name="Google Shape;135;g23bb241f12c_0_538:notes"/>
+          <p:cNvSpPr/>
+          <p:nvPr>
+            <p:ph idx="2" type="sldImg"/>
+          </p:nvPr>
+        </p:nvSpPr>
+        <p:spPr>
+          <a:xfrm>
+            <a:off x="381300" y="685800"/>
+            <a:ext cx="6096000" cy="3429000"/>
+          </a:xfrm>
+          <a:custGeom>
+            <a:rect b="b" l="l" r="r" t="t"/>
+            <a:pathLst>
+              <a:path extrusionOk="0" h="120000" w="120000">
+                <a:moveTo>
+                  <a:pt x="0" y="0"/>
+                </a:moveTo>
+                <a:lnTo>
+                  <a:pt x="120000" y="0"/>
+                </a:lnTo>
+                <a:lnTo>
+                  <a:pt x="120000" y="120000"/>
+                </a:lnTo>
+                <a:lnTo>
+                  <a:pt x="0" y="120000"/>
+                </a:lnTo>
+                <a:close/>
+              </a:path>
+            </a:pathLst>
+          </a:custGeom>
+        </p:spPr>
+      </p:sp>
+      <p:sp>
+        <p:nvSpPr>
+          <p:cNvPr id="136" name="Google Shape;136;g23bb241f12c_0_538:notes"/>
+          <p:cNvSpPr txBox="1"/>
+          <p:nvPr>
+            <p:ph idx="1" type="body"/>
+          </p:nvPr>
+        </p:nvSpPr>
+        <p:spPr>
+          <a:xfrm>
+            <a:off x="685800" y="4343400"/>
+            <a:ext cx="5486400" cy="4114800"/>
+          </a:xfrm>
+          <a:prstGeom prst="rect">
+            <a:avLst/>
+          </a:prstGeom>
+        </p:spPr>
+        <p:txBody>
+          <a:bodyPr anchorCtr="0" anchor="t" bIns="91425" lIns="91425" spcFirstLastPara="1" rIns="91425" wrap="square" tIns="91425">
+            <a:noAutofit/>
+          </a:bodyPr>
+          <a:lstStyle/>
+          <a:p>
+            <a:pPr indent="0" lvl="0" marL="0" rtl="0" algn="l">
+              <a:spcBef>
+                <a:spcPts val="0"/>
+              </a:spcBef>
+              <a:spcAft>
+                <a:spcPts val="0"/>
+              </a:spcAft>
+              <a:buNone/>
+            </a:pPr>
+            <a:r>
+              <a:rPr lang="en"/>
+              <a:t>Forecast horizon: Try 30 minute intervals (requires only 8 steps)</a:t>
+            </a:r>
+            <a:endParaRPr/>
+          </a:p>
+          <a:p>
+            <a:pPr indent="0" lvl="0" marL="0" rtl="0" algn="l">
+              <a:spcBef>
+                <a:spcPts val="0"/>
+              </a:spcBef>
+              <a:spcAft>
+                <a:spcPts val="0"/>
+              </a:spcAft>
+              <a:buNone/>
+            </a:pPr>
+            <a:r>
+              <a:rPr lang="en"/>
+              <a:t>Tune parameters: try cross validation tools</a:t>
+            </a:r>
+            <a:endParaRPr/>
+          </a:p>
+          <a:p>
+            <a:pPr indent="0" lvl="0" marL="0" rtl="0" algn="l">
+              <a:spcBef>
+                <a:spcPts val="0"/>
+              </a:spcBef>
+              <a:spcAft>
+                <a:spcPts val="0"/>
+              </a:spcAft>
+              <a:buNone/>
+            </a:pPr>
+            <a:r>
+              <a:rPr lang="en"/>
+              <a:t>TFT borrows </a:t>
+            </a:r>
+            <a:r>
+              <a:rPr lang="en"/>
+              <a:t>concepts</a:t>
+            </a:r>
+            <a:r>
+              <a:rPr lang="en"/>
+              <a:t> from Transformers for learning short and long term dependencies; it supports multi-horizon forecasts, future and past covariates</a:t>
             </a:r>
             <a:endParaRPr/>
           </a:p>
@@ -1268,82 +1409,6 @@
             </a:r>
             <a:endParaRPr/>
           </a:p>
-          <a:p>
-            <a:pPr indent="0" lvl="0" marL="0" rtl="0" algn="l">
-              <a:spcBef>
-                <a:spcPts val="0"/>
-              </a:spcBef>
-              <a:spcAft>
-                <a:spcPts val="0"/>
-              </a:spcAft>
-              <a:buNone/>
-            </a:pPr>
-            <a:r>
-              <a:rPr lang="en"/>
-              <a:t>After looking at next slide, come back to this one…</a:t>
-            </a:r>
-            <a:endParaRPr/>
-          </a:p>
-          <a:p>
-            <a:pPr indent="0" lvl="0" marL="0" rtl="0" algn="l">
-              <a:spcBef>
-                <a:spcPts val="0"/>
-              </a:spcBef>
-              <a:spcAft>
-                <a:spcPts val="0"/>
-              </a:spcAft>
-              <a:buNone/>
-            </a:pPr>
-            <a:r>
-              <a:rPr lang="en"/>
-              <a:t>Second last peak: three snacks while blood glucose is normal, but rising - insulin is injected after glucose has already risen above normal</a:t>
-            </a:r>
-            <a:endParaRPr/>
-          </a:p>
-          <a:p>
-            <a:pPr indent="0" lvl="0" marL="0" rtl="0" algn="l">
-              <a:spcBef>
-                <a:spcPts val="0"/>
-              </a:spcBef>
-              <a:spcAft>
-                <a:spcPts val="0"/>
-              </a:spcAft>
-              <a:buNone/>
-            </a:pPr>
-            <a:r>
-              <a:rPr lang="en"/>
-              <a:t>With a good forecast of the effects of the first snack, a pre-bolus strategy could have been </a:t>
-            </a:r>
-            <a:r>
-              <a:rPr lang="en"/>
-              <a:t>employed</a:t>
-            </a:r>
-            <a:r>
-              <a:rPr lang="en"/>
-              <a:t> for the </a:t>
-            </a:r>
-            <a:r>
-              <a:rPr lang="en"/>
-              <a:t>remaining snacks,</a:t>
-            </a:r>
-            <a:endParaRPr/>
-          </a:p>
-          <a:p>
-            <a:pPr indent="0" lvl="0" marL="0" rtl="0" algn="l">
-              <a:spcBef>
-                <a:spcPts val="0"/>
-              </a:spcBef>
-              <a:spcAft>
-                <a:spcPts val="0"/>
-              </a:spcAft>
-              <a:buNone/>
-            </a:pPr>
-            <a:r>
-              <a:rPr lang="en"/>
-              <a:t>potentially avoiding the peak altogether.</a:t>
-            </a:r>
-            <a:endParaRPr/>
-          </a:p>
         </p:txBody>
       </p:sp>
     </p:spTree>
@@ -1359,7 +1424,7 @@
   <p:cSld>
     <p:spTree>
       <p:nvGrpSpPr>
-        <p:cNvPr id="68" name="Shape 68"/>
+        <p:cNvPr id="67" name="Shape 67"/>
         <p:cNvGrpSpPr/>
         <p:nvPr/>
       </p:nvGrpSpPr>
@@ -1373,7 +1438,7 @@
       </p:grpSpPr>
       <p:sp>
         <p:nvSpPr>
-          <p:cNvPr id="69" name="Google Shape;69;g23bb241f12c_0_5:notes"/>
+          <p:cNvPr id="68" name="Google Shape;68;g23bb241f12c_0_5:notes"/>
           <p:cNvSpPr/>
           <p:nvPr>
             <p:ph idx="2" type="sldImg"/>
@@ -1408,7 +1473,7 @@
       </p:sp>
       <p:sp>
         <p:nvSpPr>
-          <p:cNvPr id="70" name="Google Shape;70;g23bb241f12c_0_5:notes"/>
+          <p:cNvPr id="69" name="Google Shape;69;g23bb241f12c_0_5:notes"/>
           <p:cNvSpPr txBox="1"/>
           <p:nvPr>
             <p:ph idx="1" type="body"/>
@@ -1440,7 +1505,7 @@
             </a:pPr>
             <a:r>
               <a:rPr lang="en"/>
-              <a:t>Forecast is for last ‘peak’, but if a forecast for the previous peak were available, </a:t>
+              <a:t>If a forecast for were available, a more proactive strategy (instead of reactive) could have been used to avoid the peak.</a:t>
             </a:r>
             <a:endParaRPr/>
           </a:p>
@@ -1455,24 +1520,7 @@
               <a:buNone/>
             </a:pPr>
             <a:r>
-              <a:rPr lang="en"/>
-              <a:t>a more proactive strategy (instead of reactive) could have been used to avoid the peak.</a:t>
-            </a:r>
-            <a:endParaRPr/>
-          </a:p>
-          <a:p>
-            <a:pPr indent="0" lvl="0" marL="0" rtl="0" algn="l">
-              <a:spcBef>
-                <a:spcPts val="0"/>
-              </a:spcBef>
-              <a:spcAft>
-                <a:spcPts val="0"/>
-              </a:spcAft>
-              <a:buNone/>
-            </a:pPr>
-            <a:r>
-              <a:rPr lang="en"/>
-              <a:t>Back to previous slide…</a:t>
+              <a:t/>
             </a:r>
             <a:endParaRPr/>
           </a:p>
@@ -1491,7 +1539,7 @@
   <p:cSld>
     <p:spTree>
       <p:nvGrpSpPr>
-        <p:cNvPr id="74" name="Shape 74"/>
+        <p:cNvPr id="73" name="Shape 73"/>
         <p:cNvGrpSpPr/>
         <p:nvPr/>
       </p:nvGrpSpPr>
@@ -1505,7 +1553,7 @@
       </p:grpSpPr>
       <p:sp>
         <p:nvSpPr>
-          <p:cNvPr id="75" name="Google Shape;75;g28bbcec5e1e_0_3:notes"/>
+          <p:cNvPr id="74" name="Google Shape;74;g28bbcec5e1e_0_3:notes"/>
           <p:cNvSpPr/>
           <p:nvPr>
             <p:ph idx="2" type="sldImg"/>
@@ -1540,7 +1588,7 @@
       </p:sp>
       <p:sp>
         <p:nvSpPr>
-          <p:cNvPr id="76" name="Google Shape;76;g28bbcec5e1e_0_3:notes"/>
+          <p:cNvPr id="75" name="Google Shape;75;g28bbcec5e1e_0_3:notes"/>
           <p:cNvSpPr txBox="1"/>
           <p:nvPr>
             <p:ph idx="1" type="body"/>
@@ -1611,7 +1659,7 @@
   <p:cSld>
     <p:spTree>
       <p:nvGrpSpPr>
-        <p:cNvPr id="81" name="Shape 81"/>
+        <p:cNvPr id="80" name="Shape 80"/>
         <p:cNvGrpSpPr/>
         <p:nvPr/>
       </p:nvGrpSpPr>
@@ -1625,7 +1673,7 @@
       </p:grpSpPr>
       <p:sp>
         <p:nvSpPr>
-          <p:cNvPr id="82" name="Google Shape;82;g28bbcec5e1e_0_14:notes"/>
+          <p:cNvPr id="81" name="Google Shape;81;g28bbcec5e1e_0_14:notes"/>
           <p:cNvSpPr/>
           <p:nvPr>
             <p:ph idx="2" type="sldImg"/>
@@ -1660,7 +1708,7 @@
       </p:sp>
       <p:sp>
         <p:nvSpPr>
-          <p:cNvPr id="83" name="Google Shape;83;g28bbcec5e1e_0_14:notes"/>
+          <p:cNvPr id="82" name="Google Shape;82;g28bbcec5e1e_0_14:notes"/>
           <p:cNvSpPr txBox="1"/>
           <p:nvPr>
             <p:ph idx="1" type="body"/>
@@ -1710,7 +1758,7 @@
   <p:cSld>
     <p:spTree>
       <p:nvGrpSpPr>
-        <p:cNvPr id="87" name="Shape 87"/>
+        <p:cNvPr id="86" name="Shape 86"/>
         <p:cNvGrpSpPr/>
         <p:nvPr/>
       </p:nvGrpSpPr>
@@ -1724,7 +1772,7 @@
       </p:grpSpPr>
       <p:sp>
         <p:nvSpPr>
-          <p:cNvPr id="88" name="Google Shape;88;g23bb241f12c_0_510:notes"/>
+          <p:cNvPr id="87" name="Google Shape;87;g28bbcec5e1e_0_20:notes"/>
           <p:cNvSpPr/>
           <p:nvPr>
             <p:ph idx="2" type="sldImg"/>
@@ -1759,7 +1807,7 @@
       </p:sp>
       <p:sp>
         <p:nvSpPr>
-          <p:cNvPr id="89" name="Google Shape;89;g23bb241f12c_0_510:notes"/>
+          <p:cNvPr id="88" name="Google Shape;88;g28bbcec5e1e_0_20:notes"/>
           <p:cNvSpPr txBox="1"/>
           <p:nvPr>
             <p:ph idx="1" type="body"/>
@@ -1787,13 +1835,26 @@
               <a:spcAft>
                 <a:spcPts val="0"/>
               </a:spcAft>
+              <a:buClr>
+                <a:schemeClr val="dk1"/>
+              </a:buClr>
+              <a:buSzPts val="1100"/>
+              <a:buFont typeface="Arial"/>
               <a:buNone/>
             </a:pPr>
             <a:r>
-              <a:rPr lang="en"/>
-              <a:t>Yellow bars represent gaps in CGM blood glucose data.</a:t>
+              <a:rPr lang="en">
+                <a:solidFill>
+                  <a:schemeClr val="dk1"/>
+                </a:solidFill>
+              </a:rPr>
+              <a:t>Second last peak: three snacks while blood glucose is normal, but rising - insulin is injected after glucose has already risen above normal</a:t>
             </a:r>
-            <a:endParaRPr/>
+            <a:endParaRPr>
+              <a:solidFill>
+                <a:schemeClr val="dk1"/>
+              </a:solidFill>
+            </a:endParaRPr>
           </a:p>
           <a:p>
             <a:pPr indent="0" lvl="0" marL="0" rtl="0" algn="l">
@@ -1803,13 +1864,26 @@
               <a:spcAft>
                 <a:spcPts val="0"/>
               </a:spcAft>
+              <a:buClr>
+                <a:schemeClr val="dk1"/>
+              </a:buClr>
+              <a:buSzPts val="1100"/>
+              <a:buFont typeface="Arial"/>
               <a:buNone/>
             </a:pPr>
             <a:r>
-              <a:rPr lang="en"/>
-              <a:t>These occur for example when the sensor is changed (every other week), </a:t>
+              <a:rPr lang="en">
+                <a:solidFill>
+                  <a:schemeClr val="dk1"/>
+                </a:solidFill>
+              </a:rPr>
+              <a:t>With a forecast of the effects of the first snack, a pre-bolus strategy could have been employed for the remaining snacks,</a:t>
             </a:r>
-            <a:endParaRPr/>
+            <a:endParaRPr>
+              <a:solidFill>
+                <a:schemeClr val="dk1"/>
+              </a:solidFill>
+            </a:endParaRPr>
           </a:p>
           <a:p>
             <a:pPr indent="0" lvl="0" marL="0" rtl="0" algn="l">
@@ -1819,11 +1893,39 @@
               <a:spcAft>
                 <a:spcPts val="0"/>
               </a:spcAft>
+              <a:buClr>
+                <a:schemeClr val="dk1"/>
+              </a:buClr>
+              <a:buSzPts val="1100"/>
+              <a:buFont typeface="Arial"/>
               <a:buNone/>
             </a:pPr>
             <a:r>
-              <a:rPr lang="en"/>
-              <a:t>or when the reader or phone has not read sensor data for more than the max number of hours stored.</a:t>
+              <a:rPr lang="en">
+                <a:solidFill>
+                  <a:schemeClr val="dk1"/>
+                </a:solidFill>
+              </a:rPr>
+              <a:t>potentially avoiding the peak altogether.</a:t>
+            </a:r>
+            <a:endParaRPr>
+              <a:solidFill>
+                <a:schemeClr val="dk1"/>
+              </a:solidFill>
+            </a:endParaRPr>
+          </a:p>
+          <a:p>
+            <a:pPr indent="0" lvl="0" marL="0" rtl="0" algn="l">
+              <a:spcBef>
+                <a:spcPts val="0"/>
+              </a:spcBef>
+              <a:spcAft>
+                <a:spcPts val="0"/>
+              </a:spcAft>
+              <a:buNone/>
+            </a:pPr>
+            <a:r>
+              <a:t/>
             </a:r>
             <a:endParaRPr/>
           </a:p>
@@ -1842,7 +1944,7 @@
   <p:cSld>
     <p:spTree>
       <p:nvGrpSpPr>
-        <p:cNvPr id="94" name="Shape 94"/>
+        <p:cNvPr id="93" name="Shape 93"/>
         <p:cNvGrpSpPr/>
         <p:nvPr/>
       </p:nvGrpSpPr>
@@ -1856,7 +1958,7 @@
       </p:grpSpPr>
       <p:sp>
         <p:nvSpPr>
-          <p:cNvPr id="95" name="Google Shape;95;g28bbcec5e1e_0_9:notes"/>
+          <p:cNvPr id="94" name="Google Shape;94;g23bb241f12c_0_510:notes"/>
           <p:cNvSpPr/>
           <p:nvPr>
             <p:ph idx="2" type="sldImg"/>
@@ -1891,7 +1993,7 @@
       </p:sp>
       <p:sp>
         <p:nvSpPr>
-          <p:cNvPr id="96" name="Google Shape;96;g28bbcec5e1e_0_9:notes"/>
+          <p:cNvPr id="95" name="Google Shape;95;g23bb241f12c_0_510:notes"/>
           <p:cNvSpPr txBox="1"/>
           <p:nvPr>
             <p:ph idx="1" type="body"/>
@@ -1923,7 +2025,7 @@
             </a:pPr>
             <a:r>
               <a:rPr lang="en"/>
-              <a:t>Some considerations: </a:t>
+              <a:t>Yellow bars represent gaps in CGM blood glucose data.</a:t>
             </a:r>
             <a:endParaRPr/>
           </a:p>
@@ -1939,15 +2041,7 @@
             </a:pPr>
             <a:r>
               <a:rPr lang="en"/>
-              <a:t>A common time series fill strategy is, e.g, using the last </a:t>
-            </a:r>
-            <a:r>
-              <a:rPr lang="en"/>
-              <a:t>known</a:t>
-            </a:r>
-            <a:r>
-              <a:rPr lang="en"/>
-              <a:t> value.</a:t>
+              <a:t>These occur for example when the sensor is changed (every other week), </a:t>
             </a:r>
             <a:endParaRPr/>
           </a:p>
@@ -1963,55 +2057,7 @@
             </a:pPr>
             <a:r>
               <a:rPr lang="en"/>
-              <a:t>Here, linear interpolation seemed to be a better fit.</a:t>
-            </a:r>
-            <a:endParaRPr/>
-          </a:p>
-          <a:p>
-            <a:pPr indent="0" lvl="0" marL="0" rtl="0" algn="l">
-              <a:spcBef>
-                <a:spcPts val="0"/>
-              </a:spcBef>
-              <a:spcAft>
-                <a:spcPts val="0"/>
-              </a:spcAft>
-              <a:buNone/>
-            </a:pPr>
-            <a:r>
-              <a:rPr lang="en"/>
-              <a:t>Unlike stock data, there are no naturally occuring ‘jumps’ in this physiologic data.</a:t>
-            </a:r>
-            <a:endParaRPr/>
-          </a:p>
-          <a:p>
-            <a:pPr indent="0" lvl="0" marL="0" rtl="0" algn="l">
-              <a:spcBef>
-                <a:spcPts val="0"/>
-              </a:spcBef>
-              <a:spcAft>
-                <a:spcPts val="0"/>
-              </a:spcAft>
-              <a:buNone/>
-            </a:pPr>
-            <a:r>
-              <a:rPr lang="en"/>
-              <a:t>(The question this raises is: Does this constitute data leak? </a:t>
-            </a:r>
-            <a:endParaRPr/>
-          </a:p>
-          <a:p>
-            <a:pPr indent="0" lvl="0" marL="0" rtl="0" algn="l">
-              <a:spcBef>
-                <a:spcPts val="0"/>
-              </a:spcBef>
-              <a:spcAft>
-                <a:spcPts val="0"/>
-              </a:spcAft>
-              <a:buNone/>
-            </a:pPr>
-            <a:r>
-              <a:rPr lang="en"/>
-              <a:t>During fitting of the model output chunk may contain end of a filled gap. Also, two-sided: cross-contamination.)</a:t>
+              <a:t>or when the reader or phone has not read sensor data for more than the max number of hours stored.</a:t>
             </a:r>
             <a:endParaRPr/>
           </a:p>
@@ -2030,7 +2076,7 @@
   <p:cSld>
     <p:spTree>
       <p:nvGrpSpPr>
-        <p:cNvPr id="102" name="Shape 102"/>
+        <p:cNvPr id="100" name="Shape 100"/>
         <p:cNvGrpSpPr/>
         <p:nvPr/>
       </p:nvGrpSpPr>
@@ -2044,7 +2090,7 @@
       </p:grpSpPr>
       <p:sp>
         <p:nvSpPr>
-          <p:cNvPr id="103" name="Google Shape;103;g28bbcec5e1e_0_31:notes"/>
+          <p:cNvPr id="101" name="Google Shape;101;g28bbcec5e1e_0_9:notes"/>
           <p:cNvSpPr/>
           <p:nvPr>
             <p:ph idx="2" type="sldImg"/>
@@ -2079,7 +2125,7 @@
       </p:sp>
       <p:sp>
         <p:nvSpPr>
-          <p:cNvPr id="104" name="Google Shape;104;g28bbcec5e1e_0_31:notes"/>
+          <p:cNvPr id="102" name="Google Shape;102;g28bbcec5e1e_0_9:notes"/>
           <p:cNvSpPr txBox="1"/>
           <p:nvPr>
             <p:ph idx="1" type="body"/>
@@ -2111,7 +2157,15 @@
             </a:pPr>
             <a:r>
               <a:rPr lang="en"/>
-              <a:t>In choosing the model order, lower model complexity was given preference over marginally better performance.</a:t>
+              <a:t>A common time series fill strategy is, e.g, using the last </a:t>
+            </a:r>
+            <a:r>
+              <a:rPr lang="en"/>
+              <a:t>known</a:t>
+            </a:r>
+            <a:r>
+              <a:rPr lang="en"/>
+              <a:t> value.</a:t>
             </a:r>
             <a:endParaRPr/>
           </a:p>
@@ -2127,7 +2181,55 @@
             </a:pPr>
             <a:r>
               <a:rPr lang="en"/>
-              <a:t>Lower complexity models better generalize.</a:t>
+              <a:t>Here, linear interpolation seemed to be a better fit.</a:t>
+            </a:r>
+            <a:endParaRPr/>
+          </a:p>
+          <a:p>
+            <a:pPr indent="0" lvl="0" marL="0" rtl="0" algn="l">
+              <a:spcBef>
+                <a:spcPts val="0"/>
+              </a:spcBef>
+              <a:spcAft>
+                <a:spcPts val="0"/>
+              </a:spcAft>
+              <a:buNone/>
+            </a:pPr>
+            <a:r>
+              <a:rPr lang="en"/>
+              <a:t>Unlike stock data, there are no naturally occuring ‘jumps’ in this physiologic data.</a:t>
+            </a:r>
+            <a:endParaRPr/>
+          </a:p>
+          <a:p>
+            <a:pPr indent="0" lvl="0" marL="0" rtl="0" algn="l">
+              <a:spcBef>
+                <a:spcPts val="0"/>
+              </a:spcBef>
+              <a:spcAft>
+                <a:spcPts val="0"/>
+              </a:spcAft>
+              <a:buNone/>
+            </a:pPr>
+            <a:r>
+              <a:rPr lang="en"/>
+              <a:t>(The question this raises is: Does this constitute data leak? </a:t>
+            </a:r>
+            <a:endParaRPr/>
+          </a:p>
+          <a:p>
+            <a:pPr indent="0" lvl="0" marL="0" rtl="0" algn="l">
+              <a:spcBef>
+                <a:spcPts val="0"/>
+              </a:spcBef>
+              <a:spcAft>
+                <a:spcPts val="0"/>
+              </a:spcAft>
+              <a:buNone/>
+            </a:pPr>
+            <a:r>
+              <a:rPr lang="en"/>
+              <a:t>During fitting of the model output chunk may contain end of a filled gap. Also, two-sided: cross-contamination.)</a:t>
             </a:r>
             <a:endParaRPr/>
           </a:p>
@@ -2146,7 +2248,7 @@
   <p:cSld>
     <p:spTree>
       <p:nvGrpSpPr>
-        <p:cNvPr id="109" name="Shape 109"/>
+        <p:cNvPr id="108" name="Shape 108"/>
         <p:cNvGrpSpPr/>
         <p:nvPr/>
       </p:nvGrpSpPr>
@@ -2160,7 +2262,7 @@
       </p:grpSpPr>
       <p:sp>
         <p:nvSpPr>
-          <p:cNvPr id="110" name="Google Shape;110;g24dba192ec1_0_17:notes"/>
+          <p:cNvPr id="109" name="Google Shape;109;g28bbcec5e1e_0_31:notes"/>
           <p:cNvSpPr/>
           <p:nvPr>
             <p:ph idx="2" type="sldImg"/>
@@ -2195,7 +2297,7 @@
       </p:sp>
       <p:sp>
         <p:nvSpPr>
-          <p:cNvPr id="111" name="Google Shape;111;g24dba192ec1_0_17:notes"/>
+          <p:cNvPr id="110" name="Google Shape;110;g28bbcec5e1e_0_31:notes"/>
           <p:cNvSpPr txBox="1"/>
           <p:nvPr>
             <p:ph idx="1" type="body"/>
@@ -2227,7 +2329,7 @@
             </a:pPr>
             <a:r>
               <a:rPr lang="en"/>
-              <a:t>SARIMAX with same model order determined for ARIMA.</a:t>
+              <a:t>In choosing the model order, lower model complexity was given preference over marginally better performance.</a:t>
             </a:r>
             <a:endParaRPr/>
           </a:p>
@@ -2243,39 +2345,7 @@
             </a:pPr>
             <a:r>
               <a:rPr lang="en"/>
-              <a:t>(Is this the right approach? Try using covars when finding order.)</a:t>
-            </a:r>
-            <a:endParaRPr/>
-          </a:p>
-          <a:p>
-            <a:pPr indent="0" lvl="0" marL="0" rtl="0" algn="l">
-              <a:spcBef>
-                <a:spcPts val="0"/>
-              </a:spcBef>
-              <a:spcAft>
-                <a:spcPts val="0"/>
-              </a:spcAft>
-              <a:buNone/>
-            </a:pPr>
-            <a:r>
-              <a:rPr lang="en"/>
-              <a:t>Last four hours are forecast using future covariates,</a:t>
-            </a:r>
-            <a:endParaRPr/>
-          </a:p>
-          <a:p>
-            <a:pPr indent="0" lvl="0" marL="0" rtl="0" algn="l">
-              <a:spcBef>
-                <a:spcPts val="0"/>
-              </a:spcBef>
-              <a:spcAft>
-                <a:spcPts val="0"/>
-              </a:spcAft>
-              <a:buNone/>
-            </a:pPr>
-            <a:r>
-              <a:rPr lang="en"/>
-              <a:t>remainder is one-step-ahead forecast.</a:t>
+              <a:t>Lower complexity models better generalize.</a:t>
             </a:r>
             <a:endParaRPr/>
           </a:p>
@@ -7670,7 +7740,7 @@
         </p:spPr>
         <p:txBody>
           <a:bodyPr anchorCtr="0" anchor="t" bIns="91425" lIns="91425" spcFirstLastPara="1" rIns="91425" wrap="square" tIns="91425">
-            <a:normAutofit fontScale="90000"/>
+            <a:normAutofit/>
           </a:bodyPr>
           <a:lstStyle/>
           <a:p>
@@ -7684,90 +7754,28 @@
               <a:buNone/>
             </a:pPr>
             <a:r>
-              <a:rPr lang="en" sz="2300">
+              <a:rPr lang="en" sz="2100">
                 <a:solidFill>
                   <a:schemeClr val="accent3"/>
                 </a:solidFill>
               </a:rPr>
-              <a:t>TCN model with 3 covariates</a:t>
+              <a:t>.. and used to fit a SARIMAX (2, 1, 1) </a:t>
             </a:r>
-            <a:endParaRPr sz="2300">
-              <a:solidFill>
-                <a:schemeClr val="accent3"/>
-              </a:solidFill>
-            </a:endParaRPr>
-          </a:p>
-          <a:p>
-            <a:pPr indent="0" lvl="0" marL="0" rtl="0" algn="l">
-              <a:spcBef>
-                <a:spcPts val="0"/>
-              </a:spcBef>
-              <a:spcAft>
-                <a:spcPts val="0"/>
-              </a:spcAft>
-              <a:buNone/>
-            </a:pPr>
             <a:r>
-              <a:t/>
+              <a:rPr lang="en" sz="2100">
+                <a:solidFill>
+                  <a:schemeClr val="accent3"/>
+                </a:solidFill>
+              </a:rPr>
+              <a:t>model with 3 covariates. </a:t>
             </a:r>
-            <a:endParaRPr sz="2333">
-              <a:solidFill>
-                <a:schemeClr val="accent3"/>
-              </a:solidFill>
-            </a:endParaRPr>
-          </a:p>
-        </p:txBody>
-      </p:sp>
-      <p:sp>
-        <p:nvSpPr>
-          <p:cNvPr id="120" name="Google Shape;120;p22"/>
-          <p:cNvSpPr txBox="1"/>
-          <p:nvPr>
-            <p:ph idx="1" type="body"/>
-          </p:nvPr>
-        </p:nvSpPr>
-        <p:spPr>
-          <a:xfrm>
-            <a:off x="311700" y="1152475"/>
-            <a:ext cx="8520600" cy="3416400"/>
-          </a:xfrm>
-          <a:prstGeom prst="rect">
-            <a:avLst/>
-          </a:prstGeom>
-        </p:spPr>
-        <p:txBody>
-          <a:bodyPr anchorCtr="0" anchor="t" bIns="91425" lIns="91425" spcFirstLastPara="1" rIns="91425" wrap="square" tIns="91425">
-            <a:normAutofit/>
-          </a:bodyPr>
-          <a:lstStyle/>
-          <a:p>
-            <a:pPr indent="-393700" lvl="0" marL="457200" rtl="0" algn="l">
-              <a:spcBef>
-                <a:spcPts val="0"/>
-              </a:spcBef>
-              <a:spcAft>
-                <a:spcPts val="0"/>
-              </a:spcAft>
-              <a:buClr>
-                <a:schemeClr val="dk1"/>
-              </a:buClr>
-              <a:buSzPts val="2600"/>
-              <a:buChar char="●"/>
-            </a:pPr>
-            <a:r>
-              <a:t/>
-            </a:r>
-            <a:endParaRPr sz="2600">
-              <a:solidFill>
-                <a:schemeClr val="dk1"/>
-              </a:solidFill>
-            </a:endParaRPr>
+            <a:endParaRPr sz="2100"/>
           </a:p>
         </p:txBody>
       </p:sp>
       <p:pic>
         <p:nvPicPr>
-          <p:cNvPr id="121" name="Google Shape;121;p22"/>
+          <p:cNvPr id="120" name="Google Shape;120;p22"/>
           <p:cNvPicPr preferRelativeResize="0"/>
           <p:nvPr/>
         </p:nvPicPr>
@@ -7781,8 +7789,8 @@
         </p:blipFill>
         <p:spPr>
           <a:xfrm>
-            <a:off x="0" y="1147465"/>
-            <a:ext cx="9144003" cy="2848571"/>
+            <a:off x="304800" y="1170125"/>
+            <a:ext cx="8503921" cy="2865451"/>
           </a:xfrm>
           <a:prstGeom prst="rect">
             <a:avLst/>
@@ -7806,7 +7814,7 @@
   <p:cSld>
     <p:spTree>
       <p:nvGrpSpPr>
-        <p:cNvPr id="125" name="Shape 125"/>
+        <p:cNvPr id="124" name="Shape 124"/>
         <p:cNvGrpSpPr/>
         <p:nvPr/>
       </p:nvGrpSpPr>
@@ -7820,7 +7828,7 @@
       </p:grpSpPr>
       <p:sp>
         <p:nvSpPr>
-          <p:cNvPr id="126" name="Google Shape;126;p23"/>
+          <p:cNvPr id="125" name="Google Shape;125;p23"/>
           <p:cNvSpPr txBox="1"/>
           <p:nvPr>
             <p:ph type="title"/>
@@ -7837,7 +7845,7 @@
         </p:spPr>
         <p:txBody>
           <a:bodyPr anchorCtr="0" anchor="t" bIns="91425" lIns="91425" spcFirstLastPara="1" rIns="91425" wrap="square" tIns="91425">
-            <a:normAutofit fontScale="90000"/>
+            <a:normAutofit/>
           </a:bodyPr>
           <a:lstStyle/>
           <a:p>
@@ -7851,20 +7859,24 @@
               <a:buNone/>
             </a:pPr>
             <a:r>
-              <a:rPr lang="en" sz="2342">
+              <a:rPr lang="en" sz="2300">
                 <a:solidFill>
                   <a:schemeClr val="accent3"/>
                 </a:solidFill>
               </a:rPr>
-              <a:t>A better model is needed…</a:t>
+              <a:t>A TCN model with 3 covariates looks similar to SARIMAX….</a:t>
             </a:r>
-            <a:endParaRPr/>
+            <a:endParaRPr sz="2333">
+              <a:solidFill>
+                <a:schemeClr val="accent3"/>
+              </a:solidFill>
+            </a:endParaRPr>
           </a:p>
         </p:txBody>
       </p:sp>
       <p:sp>
         <p:nvSpPr>
-          <p:cNvPr id="127" name="Google Shape;127;p23"/>
+          <p:cNvPr id="126" name="Google Shape;126;p23"/>
           <p:cNvSpPr txBox="1"/>
           <p:nvPr>
             <p:ph idx="1" type="body"/>
@@ -7899,96 +7911,7 @@
               <a:buChar char="●"/>
             </a:pPr>
             <a:r>
-              <a:rPr lang="en" sz="2600">
-                <a:solidFill>
-                  <a:schemeClr val="dk1"/>
-                </a:solidFill>
-              </a:rPr>
-              <a:t>Salvage current models </a:t>
-            </a:r>
-            <a:endParaRPr sz="2600">
-              <a:solidFill>
-                <a:srgbClr val="FFFF00"/>
-              </a:solidFill>
-            </a:endParaRPr>
-          </a:p>
-          <a:p>
-            <a:pPr indent="-393700" lvl="1" marL="914400" rtl="0" algn="l">
-              <a:spcBef>
-                <a:spcPts val="0"/>
-              </a:spcBef>
-              <a:spcAft>
-                <a:spcPts val="0"/>
-              </a:spcAft>
-              <a:buClr>
-                <a:srgbClr val="FFFF00"/>
-              </a:buClr>
-              <a:buSzPts val="2600"/>
-              <a:buChar char="○"/>
-            </a:pPr>
-            <a:r>
-              <a:rPr lang="en" sz="2600">
-                <a:solidFill>
-                  <a:srgbClr val="FFFF00"/>
-                </a:solidFill>
-              </a:rPr>
-              <a:t>Use smaller forecast horizon</a:t>
-            </a:r>
-            <a:endParaRPr sz="2600">
-              <a:solidFill>
-                <a:srgbClr val="FFFF00"/>
-              </a:solidFill>
-            </a:endParaRPr>
-          </a:p>
-          <a:p>
-            <a:pPr indent="-393700" lvl="1" marL="914400" rtl="0" algn="l">
-              <a:spcBef>
-                <a:spcPts val="0"/>
-              </a:spcBef>
-              <a:spcAft>
-                <a:spcPts val="0"/>
-              </a:spcAft>
-              <a:buClr>
-                <a:srgbClr val="FFFF00"/>
-              </a:buClr>
-              <a:buSzPts val="2600"/>
-              <a:buChar char="○"/>
-            </a:pPr>
-            <a:r>
-              <a:rPr lang="en" sz="2600">
-                <a:solidFill>
-                  <a:srgbClr val="FFFF00"/>
-                </a:solidFill>
-              </a:rPr>
-              <a:t>Improve tuning</a:t>
-            </a:r>
-            <a:endParaRPr sz="2600">
-              <a:solidFill>
-                <a:srgbClr val="FFFF00"/>
-              </a:solidFill>
-            </a:endParaRPr>
-          </a:p>
-          <a:p>
-            <a:pPr indent="-393700" lvl="0" marL="457200" rtl="0" algn="l">
-              <a:spcBef>
-                <a:spcPts val="0"/>
-              </a:spcBef>
-              <a:spcAft>
-                <a:spcPts val="0"/>
-              </a:spcAft>
-              <a:buClr>
-                <a:schemeClr val="dk1"/>
-              </a:buClr>
-              <a:buSzPts val="2600"/>
-              <a:buChar char="●"/>
-            </a:pPr>
-            <a:r>
-              <a:rPr lang="en" sz="2600">
-                <a:solidFill>
-                  <a:schemeClr val="dk1"/>
-                </a:solidFill>
-              </a:rPr>
-              <a:t>Try different model</a:t>
+              <a:t/>
             </a:r>
             <a:endParaRPr sz="2600">
               <a:solidFill>
@@ -7996,36 +7919,36 @@
               </a:solidFill>
             </a:endParaRPr>
           </a:p>
-          <a:p>
-            <a:pPr indent="-393700" lvl="1" marL="914400" rtl="0" algn="l">
-              <a:spcBef>
-                <a:spcPts val="0"/>
-              </a:spcBef>
-              <a:spcAft>
-                <a:spcPts val="0"/>
-              </a:spcAft>
-              <a:buClr>
-                <a:srgbClr val="FFFF00"/>
-              </a:buClr>
-              <a:buSzPts val="2600"/>
-              <a:buChar char="○"/>
-            </a:pPr>
-            <a:r>
-              <a:rPr lang="en" sz="2600">
-                <a:solidFill>
-                  <a:srgbClr val="FFFF00"/>
-                </a:solidFill>
-              </a:rPr>
-              <a:t>Temporal Fusion Transformer (TFT)</a:t>
-            </a:r>
-            <a:endParaRPr sz="2600">
-              <a:solidFill>
-                <a:srgbClr val="FFFF00"/>
-              </a:solidFill>
-            </a:endParaRPr>
-          </a:p>
         </p:txBody>
       </p:sp>
+      <p:pic>
+        <p:nvPicPr>
+          <p:cNvPr id="127" name="Google Shape;127;p23"/>
+          <p:cNvPicPr preferRelativeResize="0"/>
+          <p:nvPr/>
+        </p:nvPicPr>
+        <p:blipFill>
+          <a:blip r:embed="rId3">
+            <a:alphaModFix/>
+          </a:blip>
+          <a:stretch>
+            <a:fillRect/>
+          </a:stretch>
+        </p:blipFill>
+        <p:spPr>
+          <a:xfrm>
+            <a:off x="304800" y="1147465"/>
+            <a:ext cx="8503921" cy="2636214"/>
+          </a:xfrm>
+          <a:prstGeom prst="rect">
+            <a:avLst/>
+          </a:prstGeom>
+          <a:noFill/>
+          <a:ln>
+            <a:noFill/>
+          </a:ln>
+        </p:spPr>
+      </p:pic>
     </p:spTree>
   </p:cSld>
   <p:clrMapOvr>
@@ -8070,7 +7993,7 @@
         </p:spPr>
         <p:txBody>
           <a:bodyPr anchorCtr="0" anchor="t" bIns="91425" lIns="91425" spcFirstLastPara="1" rIns="91425" wrap="square" tIns="91425">
-            <a:normAutofit fontScale="90000"/>
+            <a:normAutofit/>
           </a:bodyPr>
           <a:lstStyle/>
           <a:p>
@@ -8084,14 +8007,18 @@
               <a:buNone/>
             </a:pPr>
             <a:r>
-              <a:rPr lang="en" sz="2342">
+              <a:rPr lang="en" sz="2300">
                 <a:solidFill>
                   <a:schemeClr val="accent3"/>
                 </a:solidFill>
               </a:rPr>
-              <a:t>… meanwhile, look at the next two hours.</a:t>
+              <a:t>… after TNC with 1 covariate seemed so promising.</a:t>
             </a:r>
-            <a:endParaRPr/>
+            <a:endParaRPr sz="2333">
+              <a:solidFill>
+                <a:schemeClr val="accent3"/>
+              </a:solidFill>
+            </a:endParaRPr>
           </a:p>
         </p:txBody>
       </p:sp>
@@ -8101,17 +8028,18 @@
           <p:cNvPicPr preferRelativeResize="0"/>
           <p:nvPr/>
         </p:nvPicPr>
-        <p:blipFill rotWithShape="1">
+        <p:blipFill>
           <a:blip r:embed="rId3">
             <a:alphaModFix/>
           </a:blip>
-          <a:srcRect b="0" l="79185" r="0" t="0"/>
-          <a:stretch/>
+          <a:stretch>
+            <a:fillRect/>
+          </a:stretch>
         </p:blipFill>
         <p:spPr>
           <a:xfrm>
-            <a:off x="4822675" y="1262825"/>
-            <a:ext cx="1903273" cy="2790550"/>
+            <a:off x="304800" y="1170125"/>
+            <a:ext cx="8503921" cy="2645665"/>
           </a:xfrm>
           <a:prstGeom prst="rect">
             <a:avLst/>
@@ -8122,33 +8050,286 @@
           </a:ln>
         </p:spPr>
       </p:pic>
-      <p:pic>
-        <p:nvPicPr>
-          <p:cNvPr id="134" name="Google Shape;134;p24"/>
-          <p:cNvPicPr preferRelativeResize="0"/>
-          <p:nvPr/>
-        </p:nvPicPr>
-        <p:blipFill rotWithShape="1">
-          <a:blip r:embed="rId4">
-            <a:alphaModFix/>
-          </a:blip>
-          <a:srcRect b="0" l="78875" r="0" t="0"/>
-          <a:stretch/>
-        </p:blipFill>
+    </p:spTree>
+  </p:cSld>
+  <p:clrMapOvr>
+    <a:masterClrMapping/>
+  </p:clrMapOvr>
+</p:sld>
+</file>
+
+<file path=ppt/slides/slide13.xml><?xml version="1.0" encoding="utf-8"?>
+<p:sld xmlns:a="http://schemas.openxmlformats.org/drawingml/2006/main" xmlns:r="http://schemas.openxmlformats.org/officeDocument/2006/relationships" xmlns:mc="http://schemas.openxmlformats.org/markup-compatibility/2006" xmlns:mv="urn:schemas-microsoft-com:mac:vml" xmlns:p="http://schemas.openxmlformats.org/presentationml/2006/main" xmlns:c="http://schemas.openxmlformats.org/drawingml/2006/chart" xmlns:dgm="http://schemas.openxmlformats.org/drawingml/2006/diagram" xmlns:o="urn:schemas-microsoft-com:office:office" xmlns:v="urn:schemas-microsoft-com:vml" xmlns:pvml="urn:schemas-microsoft-com:office:powerpoint" xmlns:com="http://schemas.openxmlformats.org/drawingml/2006/compatibility" xmlns:p14="http://schemas.microsoft.com/office/powerpoint/2010/main" xmlns:p15="http://schemas.microsoft.com/office/powerpoint/2012/main" xmlns:ahyp="http://schemas.microsoft.com/office/drawing/2018/hyperlinkcolor">
+  <p:cSld>
+    <p:spTree>
+      <p:nvGrpSpPr>
+        <p:cNvPr id="137" name="Shape 137"/>
+        <p:cNvGrpSpPr/>
+        <p:nvPr/>
+      </p:nvGrpSpPr>
+      <p:grpSpPr>
+        <a:xfrm>
+          <a:off x="0" y="0"/>
+          <a:ext cx="0" cy="0"/>
+          <a:chOff x="0" y="0"/>
+          <a:chExt cx="0" cy="0"/>
+        </a:xfrm>
+      </p:grpSpPr>
+      <p:sp>
+        <p:nvSpPr>
+          <p:cNvPr id="138" name="Google Shape;138;p25"/>
+          <p:cNvSpPr txBox="1"/>
+          <p:nvPr>
+            <p:ph type="title"/>
+          </p:nvPr>
+        </p:nvSpPr>
         <p:spPr>
           <a:xfrm>
-            <a:off x="2430828" y="1290600"/>
-            <a:ext cx="1867223" cy="2753626"/>
+            <a:off x="311700" y="445025"/>
+            <a:ext cx="8520600" cy="572700"/>
           </a:xfrm>
           <a:prstGeom prst="rect">
             <a:avLst/>
           </a:prstGeom>
-          <a:noFill/>
-          <a:ln>
-            <a:noFill/>
-          </a:ln>
         </p:spPr>
-      </p:pic>
+        <p:txBody>
+          <a:bodyPr anchorCtr="0" anchor="t" bIns="91425" lIns="91425" spcFirstLastPara="1" rIns="91425" wrap="square" tIns="91425">
+            <a:normAutofit fontScale="90000"/>
+          </a:bodyPr>
+          <a:lstStyle/>
+          <a:p>
+            <a:pPr indent="0" lvl="0" marL="0" rtl="0" algn="l">
+              <a:spcBef>
+                <a:spcPts val="0"/>
+              </a:spcBef>
+              <a:spcAft>
+                <a:spcPts val="0"/>
+              </a:spcAft>
+              <a:buNone/>
+            </a:pPr>
+            <a:r>
+              <a:rPr lang="en" sz="2342">
+                <a:solidFill>
+                  <a:schemeClr val="accent3"/>
+                </a:solidFill>
+              </a:rPr>
+              <a:t>A better model is needed…</a:t>
+            </a:r>
+            <a:endParaRPr/>
+          </a:p>
+        </p:txBody>
+      </p:sp>
+      <p:sp>
+        <p:nvSpPr>
+          <p:cNvPr id="139" name="Google Shape;139;p25"/>
+          <p:cNvSpPr txBox="1"/>
+          <p:nvPr>
+            <p:ph idx="1" type="body"/>
+          </p:nvPr>
+        </p:nvSpPr>
+        <p:spPr>
+          <a:xfrm>
+            <a:off x="311700" y="1152475"/>
+            <a:ext cx="8520600" cy="3416400"/>
+          </a:xfrm>
+          <a:prstGeom prst="rect">
+            <a:avLst/>
+          </a:prstGeom>
+        </p:spPr>
+        <p:txBody>
+          <a:bodyPr anchorCtr="0" anchor="t" bIns="91425" lIns="91425" spcFirstLastPara="1" rIns="91425" wrap="square" tIns="91425">
+            <a:normAutofit lnSpcReduction="10000"/>
+          </a:bodyPr>
+          <a:lstStyle/>
+          <a:p>
+            <a:pPr indent="-393700" lvl="0" marL="457200" rtl="0" algn="l">
+              <a:spcBef>
+                <a:spcPts val="0"/>
+              </a:spcBef>
+              <a:spcAft>
+                <a:spcPts val="0"/>
+              </a:spcAft>
+              <a:buClr>
+                <a:schemeClr val="dk1"/>
+              </a:buClr>
+              <a:buSzPts val="2600"/>
+              <a:buChar char="●"/>
+            </a:pPr>
+            <a:r>
+              <a:rPr lang="en" sz="2600">
+                <a:solidFill>
+                  <a:schemeClr val="dk1"/>
+                </a:solidFill>
+              </a:rPr>
+              <a:t>Salvage current models </a:t>
+            </a:r>
+            <a:endParaRPr sz="2600">
+              <a:solidFill>
+                <a:srgbClr val="FFFF00"/>
+              </a:solidFill>
+            </a:endParaRPr>
+          </a:p>
+          <a:p>
+            <a:pPr indent="-393700" lvl="1" marL="914400" rtl="0" algn="l">
+              <a:spcBef>
+                <a:spcPts val="0"/>
+              </a:spcBef>
+              <a:spcAft>
+                <a:spcPts val="0"/>
+              </a:spcAft>
+              <a:buClr>
+                <a:srgbClr val="FFFF00"/>
+              </a:buClr>
+              <a:buSzPts val="2600"/>
+              <a:buChar char="○"/>
+            </a:pPr>
+            <a:r>
+              <a:rPr lang="en" sz="2600">
+                <a:solidFill>
+                  <a:srgbClr val="FFFF00"/>
+                </a:solidFill>
+              </a:rPr>
+              <a:t>Use smaller forecast horizon</a:t>
+            </a:r>
+            <a:endParaRPr sz="2600">
+              <a:solidFill>
+                <a:srgbClr val="FFFF00"/>
+              </a:solidFill>
+            </a:endParaRPr>
+          </a:p>
+          <a:p>
+            <a:pPr indent="-393700" lvl="1" marL="914400" rtl="0" algn="l">
+              <a:spcBef>
+                <a:spcPts val="0"/>
+              </a:spcBef>
+              <a:spcAft>
+                <a:spcPts val="0"/>
+              </a:spcAft>
+              <a:buClr>
+                <a:srgbClr val="FFFF00"/>
+              </a:buClr>
+              <a:buSzPts val="2600"/>
+              <a:buChar char="○"/>
+            </a:pPr>
+            <a:r>
+              <a:rPr lang="en" sz="2600">
+                <a:solidFill>
+                  <a:srgbClr val="FFFF00"/>
+                </a:solidFill>
+              </a:rPr>
+              <a:t>Improve tuning</a:t>
+            </a:r>
+            <a:endParaRPr sz="2600">
+              <a:solidFill>
+                <a:srgbClr val="FFFF00"/>
+              </a:solidFill>
+            </a:endParaRPr>
+          </a:p>
+          <a:p>
+            <a:pPr indent="-393700" lvl="0" marL="457200" rtl="0" algn="l">
+              <a:spcBef>
+                <a:spcPts val="0"/>
+              </a:spcBef>
+              <a:spcAft>
+                <a:spcPts val="0"/>
+              </a:spcAft>
+              <a:buClr>
+                <a:schemeClr val="dk1"/>
+              </a:buClr>
+              <a:buSzPts val="2600"/>
+              <a:buChar char="●"/>
+            </a:pPr>
+            <a:r>
+              <a:rPr lang="en" sz="2600">
+                <a:solidFill>
+                  <a:schemeClr val="dk1"/>
+                </a:solidFill>
+              </a:rPr>
+              <a:t>Try different model</a:t>
+            </a:r>
+            <a:endParaRPr sz="2600">
+              <a:solidFill>
+                <a:schemeClr val="dk1"/>
+              </a:solidFill>
+            </a:endParaRPr>
+          </a:p>
+          <a:p>
+            <a:pPr indent="-393700" lvl="1" marL="914400" rtl="0" algn="l">
+              <a:spcBef>
+                <a:spcPts val="0"/>
+              </a:spcBef>
+              <a:spcAft>
+                <a:spcPts val="0"/>
+              </a:spcAft>
+              <a:buClr>
+                <a:srgbClr val="FFFF00"/>
+              </a:buClr>
+              <a:buSzPts val="2600"/>
+              <a:buChar char="○"/>
+            </a:pPr>
+            <a:r>
+              <a:rPr lang="en" sz="2600">
+                <a:solidFill>
+                  <a:srgbClr val="FFFF00"/>
+                </a:solidFill>
+              </a:rPr>
+              <a:t>Temporal Fusion Transformer (TFT)</a:t>
+            </a:r>
+            <a:endParaRPr sz="2600">
+              <a:solidFill>
+                <a:srgbClr val="FFFF00"/>
+              </a:solidFill>
+            </a:endParaRPr>
+          </a:p>
+          <a:p>
+            <a:pPr indent="0" lvl="0" marL="914400" rtl="0" algn="l">
+              <a:spcBef>
+                <a:spcPts val="1200"/>
+              </a:spcBef>
+              <a:spcAft>
+                <a:spcPts val="0"/>
+              </a:spcAft>
+              <a:buNone/>
+            </a:pPr>
+            <a:r>
+              <a:t/>
+            </a:r>
+            <a:endParaRPr sz="2600">
+              <a:solidFill>
+                <a:srgbClr val="FFFF00"/>
+              </a:solidFill>
+            </a:endParaRPr>
+          </a:p>
+          <a:p>
+            <a:pPr indent="0" lvl="0" marL="0" rtl="0" algn="l">
+              <a:lnSpc>
+                <a:spcPct val="100000"/>
+              </a:lnSpc>
+              <a:spcBef>
+                <a:spcPts val="1200"/>
+              </a:spcBef>
+              <a:spcAft>
+                <a:spcPts val="0"/>
+              </a:spcAft>
+              <a:buNone/>
+            </a:pPr>
+            <a:r>
+              <a:rPr lang="en" sz="2342">
+                <a:latin typeface="Oswald"/>
+                <a:ea typeface="Oswald"/>
+                <a:cs typeface="Oswald"/>
+                <a:sym typeface="Oswald"/>
+              </a:rPr>
+              <a:t>…meanwhile, only use the first 2 hours of forecast. </a:t>
+            </a:r>
+            <a:endParaRPr sz="2600">
+              <a:solidFill>
+                <a:srgbClr val="FFFF00"/>
+              </a:solidFill>
+            </a:endParaRPr>
+          </a:p>
+        </p:txBody>
+      </p:sp>
     </p:spTree>
   </p:cSld>
   <p:clrMapOvr>
@@ -8213,7 +8394,39 @@
                   <a:schemeClr val="accent3"/>
                 </a:solidFill>
               </a:rPr>
-              <a:t>Blood glucose out of range requires frequent adjustments …</a:t>
+              <a:t>Blood </a:t>
+            </a:r>
+            <a:r>
+              <a:rPr lang="en" sz="2120">
+                <a:solidFill>
+                  <a:srgbClr val="CC4125"/>
+                </a:solidFill>
+              </a:rPr>
+              <a:t>glucose</a:t>
+            </a:r>
+            <a:r>
+              <a:rPr lang="en" sz="2120">
+                <a:solidFill>
+                  <a:schemeClr val="accent3"/>
+                </a:solidFill>
+              </a:rPr>
+              <a:t> </a:t>
+            </a:r>
+            <a:r>
+              <a:rPr lang="en" sz="2120">
+                <a:solidFill>
+                  <a:srgbClr val="CC4125"/>
+                </a:solidFill>
+              </a:rPr>
+              <a:t>out of range</a:t>
+            </a:r>
+            <a:r>
+              <a:rPr lang="en" sz="2120">
+                <a:solidFill>
+                  <a:schemeClr val="accent3"/>
+                </a:solidFill>
+              </a:rPr>
+              <a:t> requires frequent adjustments …</a:t>
             </a:r>
             <a:endParaRPr sz="2120">
               <a:solidFill>
@@ -8223,52 +8436,9 @@
           </a:p>
         </p:txBody>
       </p:sp>
-      <p:sp>
-        <p:nvSpPr>
-          <p:cNvPr id="66" name="Google Shape;66;p14"/>
-          <p:cNvSpPr txBox="1"/>
-          <p:nvPr>
-            <p:ph idx="1" type="body"/>
-          </p:nvPr>
-        </p:nvSpPr>
-        <p:spPr>
-          <a:xfrm>
-            <a:off x="235500" y="1152475"/>
-            <a:ext cx="8520600" cy="3416400"/>
-          </a:xfrm>
-          <a:prstGeom prst="rect">
-            <a:avLst/>
-          </a:prstGeom>
-        </p:spPr>
-        <p:txBody>
-          <a:bodyPr anchorCtr="0" anchor="t" bIns="91425" lIns="91425" spcFirstLastPara="1" rIns="91425" wrap="square" tIns="91425">
-            <a:normAutofit/>
-          </a:bodyPr>
-          <a:lstStyle/>
-          <a:p>
-            <a:pPr indent="0" lvl="0" marL="457200" rtl="0" algn="l">
-              <a:spcBef>
-                <a:spcPts val="0"/>
-              </a:spcBef>
-              <a:spcAft>
-                <a:spcPts val="1200"/>
-              </a:spcAft>
-              <a:buNone/>
-            </a:pPr>
-            <a:r>
-              <a:t/>
-            </a:r>
-            <a:endParaRPr sz="2600">
-              <a:solidFill>
-                <a:schemeClr val="dk1"/>
-              </a:solidFill>
-            </a:endParaRPr>
-          </a:p>
-        </p:txBody>
-      </p:sp>
       <p:pic>
         <p:nvPicPr>
-          <p:cNvPr id="67" name="Google Shape;67;p14"/>
+          <p:cNvPr id="66" name="Google Shape;66;p14"/>
           <p:cNvPicPr preferRelativeResize="0"/>
           <p:nvPr/>
         </p:nvPicPr>
@@ -8282,8 +8452,8 @@
         </p:blipFill>
         <p:spPr>
           <a:xfrm>
-            <a:off x="0" y="1236762"/>
-            <a:ext cx="9144003" cy="2669977"/>
+            <a:off x="304800" y="1389162"/>
+            <a:ext cx="8595359" cy="2492654"/>
           </a:xfrm>
           <a:prstGeom prst="rect">
             <a:avLst/>
@@ -8307,7 +8477,7 @@
   <p:cSld>
     <p:spTree>
       <p:nvGrpSpPr>
-        <p:cNvPr id="71" name="Shape 71"/>
+        <p:cNvPr id="70" name="Shape 70"/>
         <p:cNvGrpSpPr/>
         <p:nvPr/>
       </p:nvGrpSpPr>
@@ -8321,7 +8491,7 @@
       </p:grpSpPr>
       <p:sp>
         <p:nvSpPr>
-          <p:cNvPr id="72" name="Google Shape;72;p15"/>
+          <p:cNvPr id="71" name="Google Shape;71;p15"/>
           <p:cNvSpPr txBox="1"/>
           <p:nvPr>
             <p:ph type="title"/>
@@ -8357,15 +8527,15 @@
                   <a:schemeClr val="accent3"/>
                 </a:solidFill>
               </a:rPr>
-              <a:t>… that could be avoided if we had a </a:t>
+              <a:t>… that could be avoided with a</a:t>
             </a:r>
             <a:r>
               <a:rPr lang="en" sz="2100">
                 <a:solidFill>
-                  <a:schemeClr val="accent3"/>
+                  <a:srgbClr val="CC4125"/>
                 </a:solidFill>
               </a:rPr>
-              <a:t>reliable</a:t>
+              <a:t> glucose prediction</a:t>
             </a:r>
             <a:r>
               <a:rPr lang="en" sz="2100">
@@ -8373,7 +8543,7 @@
                   <a:schemeClr val="accent3"/>
                 </a:solidFill>
               </a:rPr>
-              <a:t> blood glucose prediction.</a:t>
+              <a:t>.</a:t>
             </a:r>
             <a:endParaRPr b="1" sz="2100">
               <a:solidFill>
@@ -8385,7 +8555,7 @@
       </p:sp>
       <p:pic>
         <p:nvPicPr>
-          <p:cNvPr id="73" name="Google Shape;73;p15"/>
+          <p:cNvPr id="72" name="Google Shape;72;p15"/>
           <p:cNvPicPr preferRelativeResize="0"/>
           <p:nvPr/>
         </p:nvPicPr>
@@ -8399,8 +8569,8 @@
         </p:blipFill>
         <p:spPr>
           <a:xfrm>
-            <a:off x="152400" y="1170125"/>
-            <a:ext cx="8839204" cy="2753619"/>
+            <a:off x="304800" y="1398725"/>
+            <a:ext cx="8503921" cy="2645665"/>
           </a:xfrm>
           <a:prstGeom prst="rect">
             <a:avLst/>
@@ -8424,7 +8594,7 @@
   <p:cSld>
     <p:spTree>
       <p:nvGrpSpPr>
-        <p:cNvPr id="77" name="Shape 77"/>
+        <p:cNvPr id="76" name="Shape 76"/>
         <p:cNvGrpSpPr/>
         <p:nvPr/>
       </p:nvGrpSpPr>
@@ -8438,7 +8608,7 @@
       </p:grpSpPr>
       <p:sp>
         <p:nvSpPr>
-          <p:cNvPr id="78" name="Google Shape;78;p16"/>
+          <p:cNvPr id="77" name="Google Shape;77;p16"/>
           <p:cNvSpPr txBox="1"/>
           <p:nvPr>
             <p:ph type="title"/>
@@ -8502,7 +8672,7 @@
       </p:sp>
       <p:sp>
         <p:nvSpPr>
-          <p:cNvPr id="79" name="Google Shape;79;p16"/>
+          <p:cNvPr id="78" name="Google Shape;78;p16"/>
           <p:cNvSpPr txBox="1"/>
           <p:nvPr>
             <p:ph idx="1" type="body"/>
@@ -8519,18 +8689,18 @@
         </p:spPr>
         <p:txBody>
           <a:bodyPr anchorCtr="0" anchor="t" bIns="91425" lIns="91425" spcFirstLastPara="1" rIns="91425" wrap="square" tIns="91425">
-            <a:normAutofit/>
+            <a:normAutofit fontScale="92500" lnSpcReduction="10000"/>
           </a:bodyPr>
           <a:lstStyle/>
           <a:p>
-            <a:pPr indent="-393700" lvl="0" marL="457200" rtl="0" algn="l">
-              <a:spcBef>
-                <a:spcPts val="0"/>
-              </a:spcBef>
-              <a:spcAft>
-                <a:spcPts val="0"/>
-              </a:spcAft>
-              <a:buSzPts val="2600"/>
+            <a:pPr indent="-381317" lvl="0" marL="457200" rtl="0" algn="l">
+              <a:spcBef>
+                <a:spcPts val="0"/>
+              </a:spcBef>
+              <a:spcAft>
+                <a:spcPts val="0"/>
+              </a:spcAft>
+              <a:buSzPct val="100000"/>
               <a:buChar char="●"/>
             </a:pPr>
             <a:r>
@@ -8626,12 +8796,41 @@
                 <a:spcPts val="1200"/>
               </a:spcBef>
               <a:spcAft>
-                <a:spcPts val="1200"/>
+                <a:spcPts val="0"/>
               </a:spcAft>
               <a:buNone/>
             </a:pPr>
             <a:r>
-              <a:t/>
+              <a:rPr lang="en">
+                <a:solidFill>
+                  <a:schemeClr val="dk1"/>
+                </a:solidFill>
+              </a:rPr>
+              <a:t>SARIMAX: Seasonal AutoRegressive Integrated Moving Average with eXogenous variables</a:t>
+            </a:r>
+            <a:endParaRPr>
+              <a:solidFill>
+                <a:schemeClr val="dk1"/>
+              </a:solidFill>
+            </a:endParaRPr>
+          </a:p>
+          <a:p>
+            <a:pPr indent="0" lvl="0" marL="0" rtl="0" algn="l">
+              <a:spcBef>
+                <a:spcPts val="1200"/>
+              </a:spcBef>
+              <a:spcAft>
+                <a:spcPts val="1200"/>
+              </a:spcAft>
+              <a:buNone/>
+            </a:pPr>
+            <a:r>
+              <a:rPr lang="en">
+                <a:solidFill>
+                  <a:schemeClr val="dk1"/>
+                </a:solidFill>
+              </a:rPr>
+              <a:t>TCN: Temporal Convolutional Network</a:t>
             </a:r>
             <a:endParaRPr>
               <a:solidFill>
@@ -8643,12 +8842,12 @@
       </p:sp>
       <p:graphicFrame>
         <p:nvGraphicFramePr>
-          <p:cNvPr id="80" name="Google Shape;80;p16"/>
+          <p:cNvPr id="79" name="Google Shape;79;p16"/>
           <p:cNvGraphicFramePr/>
           <p:nvPr/>
         </p:nvGraphicFramePr>
         <p:xfrm>
-          <a:off x="914400" y="2468880"/>
+          <a:off x="827750" y="2209005"/>
           <a:ext cx="3000000" cy="3000000"/>
         </p:xfrm>
         <a:graphic>
@@ -8656,7 +8855,7 @@
             <a:tbl>
               <a:tblPr>
                 <a:noFill/>
-                <a:tableStyleId>{ADFE7F28-4D69-48B4-9A2B-A60A262C3829}</a:tableStyleId>
+                <a:tableStyleId>{C7BFEF50-424B-4F26-BE81-ABAA4F64758C}</a:tableStyleId>
               </a:tblPr>
               <a:tblGrid>
                 <a:gridCol w="3619500"/>
@@ -8732,7 +8931,7 @@
                           <a:cs typeface="Average"/>
                           <a:sym typeface="Average"/>
                         </a:rPr>
-                        <a:t>TNC</a:t>
+                        <a:t>TCN</a:t>
                       </a:r>
                       <a:endParaRPr/>
                     </a:p>
@@ -8827,7 +9026,7 @@
   <p:cSld>
     <p:spTree>
       <p:nvGrpSpPr>
-        <p:cNvPr id="84" name="Shape 84"/>
+        <p:cNvPr id="83" name="Shape 83"/>
         <p:cNvGrpSpPr/>
         <p:nvPr/>
       </p:nvGrpSpPr>
@@ -8841,7 +9040,7 @@
       </p:grpSpPr>
       <p:sp>
         <p:nvSpPr>
-          <p:cNvPr id="85" name="Google Shape;85;p17"/>
+          <p:cNvPr id="84" name="Google Shape;84;p17"/>
           <p:cNvSpPr txBox="1"/>
           <p:nvPr>
             <p:ph type="title"/>
@@ -8877,24 +9076,8 @@
                   <a:schemeClr val="accent3"/>
                 </a:solidFill>
               </a:rPr>
-              <a:t>… is not good enough.</a:t>
+              <a:t>… is not good enough, …</a:t>
             </a:r>
-            <a:endParaRPr sz="2300">
-              <a:solidFill>
-                <a:schemeClr val="accent3"/>
-              </a:solidFill>
-            </a:endParaRPr>
-          </a:p>
-          <a:p>
-            <a:pPr indent="0" lvl="0" marL="0" rtl="0" algn="l">
-              <a:spcBef>
-                <a:spcPts val="0"/>
-              </a:spcBef>
-              <a:spcAft>
-                <a:spcPts val="0"/>
-              </a:spcAft>
-              <a:buNone/>
-            </a:pPr>
             <a:r>
               <a:rPr lang="en"/>
               <a:t> </a:t>
@@ -8905,7 +9088,7 @@
       </p:sp>
       <p:sp>
         <p:nvSpPr>
-          <p:cNvPr id="86" name="Google Shape;86;p17"/>
+          <p:cNvPr id="85" name="Google Shape;85;p17"/>
           <p:cNvSpPr txBox="1"/>
           <p:nvPr>
             <p:ph idx="1" type="body"/>
@@ -9020,7 +9203,7 @@
   <p:cSld>
     <p:spTree>
       <p:nvGrpSpPr>
-        <p:cNvPr id="90" name="Shape 90"/>
+        <p:cNvPr id="89" name="Shape 89"/>
         <p:cNvGrpSpPr/>
         <p:nvPr/>
       </p:nvGrpSpPr>
@@ -9034,7 +9217,7 @@
       </p:grpSpPr>
       <p:sp>
         <p:nvSpPr>
-          <p:cNvPr id="91" name="Google Shape;91;p18"/>
+          <p:cNvPr id="90" name="Google Shape;90;p18"/>
           <p:cNvSpPr txBox="1"/>
           <p:nvPr>
             <p:ph type="title"/>
@@ -9051,7 +9234,7 @@
         </p:spPr>
         <p:txBody>
           <a:bodyPr anchorCtr="0" anchor="t" bIns="91425" lIns="91425" spcFirstLastPara="1" rIns="91425" wrap="square" tIns="91425">
-            <a:normAutofit/>
+            <a:normAutofit fontScale="90000"/>
           </a:bodyPr>
           <a:lstStyle/>
           <a:p>
@@ -9065,97 +9248,61 @@
               <a:buNone/>
             </a:pPr>
             <a:r>
-              <a:rPr lang="en" sz="2100">
+              <a:rPr lang="en" sz="2342">
                 <a:solidFill>
                   <a:schemeClr val="accent3"/>
                 </a:solidFill>
               </a:rPr>
-              <a:t>Using CGM data…</a:t>
+              <a:t>… but may still be useful for 2 hours of the forecast.</a:t>
             </a:r>
-            <a:endParaRPr sz="2100"/>
-          </a:p>
-        </p:txBody>
-      </p:sp>
-      <p:sp>
-        <p:nvSpPr>
-          <p:cNvPr id="92" name="Google Shape;92;p18"/>
-          <p:cNvSpPr txBox="1"/>
-          <p:nvPr>
-            <p:ph idx="1" type="body"/>
-          </p:nvPr>
-        </p:nvSpPr>
-        <p:spPr>
-          <a:xfrm>
-            <a:off x="311700" y="1152475"/>
-            <a:ext cx="8520600" cy="3416400"/>
-          </a:xfrm>
-          <a:prstGeom prst="rect">
-            <a:avLst/>
-          </a:prstGeom>
-        </p:spPr>
-        <p:txBody>
-          <a:bodyPr anchorCtr="0" anchor="t" bIns="91425" lIns="91425" spcFirstLastPara="1" rIns="91425" wrap="square" tIns="91425">
-            <a:normAutofit/>
-          </a:bodyPr>
-          <a:lstStyle/>
-          <a:p>
-            <a:pPr indent="0" lvl="0" marL="457200" rtl="0" algn="l">
-              <a:spcBef>
-                <a:spcPts val="0"/>
-              </a:spcBef>
-              <a:spcAft>
-                <a:spcPts val="0"/>
-              </a:spcAft>
-              <a:buNone/>
-            </a:pPr>
-            <a:r>
-              <a:t/>
-            </a:r>
-            <a:endParaRPr sz="2600">
-              <a:solidFill>
-                <a:schemeClr val="dk1"/>
-              </a:solidFill>
-            </a:endParaRPr>
-          </a:p>
-          <a:p>
-            <a:pPr indent="0" lvl="0" marL="0" rtl="0" algn="l">
-              <a:spcBef>
-                <a:spcPts val="1200"/>
-              </a:spcBef>
-              <a:spcAft>
-                <a:spcPts val="1200"/>
-              </a:spcAft>
-              <a:buNone/>
-            </a:pPr>
-            <a:r>
-              <a:t/>
-            </a:r>
-            <a:endParaRPr>
-              <a:solidFill>
-                <a:schemeClr val="dk1"/>
-              </a:solidFill>
-            </a:endParaRPr>
+            <a:endParaRPr/>
           </a:p>
         </p:txBody>
       </p:sp>
       <p:pic>
         <p:nvPicPr>
-          <p:cNvPr id="93" name="Google Shape;93;p18"/>
+          <p:cNvPr id="91" name="Google Shape;91;p18"/>
           <p:cNvPicPr preferRelativeResize="0"/>
           <p:nvPr/>
         </p:nvPicPr>
-        <p:blipFill>
+        <p:blipFill rotWithShape="1">
           <a:blip r:embed="rId3">
             <a:alphaModFix/>
           </a:blip>
-          <a:stretch>
-            <a:fillRect/>
-          </a:stretch>
+          <a:srcRect b="0" l="79185" r="0" t="0"/>
+          <a:stretch/>
         </p:blipFill>
         <p:spPr>
           <a:xfrm>
-            <a:off x="0" y="1622971"/>
-            <a:ext cx="9144003" cy="1897559"/>
+            <a:off x="3869775" y="1138200"/>
+            <a:ext cx="2285998" cy="3348991"/>
+          </a:xfrm>
+          <a:prstGeom prst="rect">
+            <a:avLst/>
+          </a:prstGeom>
+          <a:noFill/>
+          <a:ln>
+            <a:noFill/>
+          </a:ln>
+        </p:spPr>
+      </p:pic>
+      <p:pic>
+        <p:nvPicPr>
+          <p:cNvPr id="92" name="Google Shape;92;p18"/>
+          <p:cNvPicPr preferRelativeResize="0"/>
+          <p:nvPr/>
+        </p:nvPicPr>
+        <p:blipFill rotWithShape="1">
+          <a:blip r:embed="rId4">
+            <a:alphaModFix/>
+          </a:blip>
+          <a:srcRect b="0" l="78875" r="0" t="0"/>
+          <a:stretch/>
+        </p:blipFill>
+        <p:spPr>
+          <a:xfrm>
+            <a:off x="1059228" y="1138200"/>
+            <a:ext cx="2285998" cy="3371851"/>
           </a:xfrm>
           <a:prstGeom prst="rect">
             <a:avLst/>
@@ -9179,7 +9326,7 @@
   <p:cSld>
     <p:spTree>
       <p:nvGrpSpPr>
-        <p:cNvPr id="97" name="Shape 97"/>
+        <p:cNvPr id="96" name="Shape 96"/>
         <p:cNvGrpSpPr/>
         <p:nvPr/>
       </p:nvGrpSpPr>
@@ -9193,7 +9340,7 @@
       </p:grpSpPr>
       <p:sp>
         <p:nvSpPr>
-          <p:cNvPr id="98" name="Google Shape;98;p19"/>
+          <p:cNvPr id="97" name="Google Shape;97;p19"/>
           <p:cNvSpPr txBox="1"/>
           <p:nvPr>
             <p:ph type="title"/>
@@ -9229,6 +9376,161 @@
                   <a:schemeClr val="accent3"/>
                 </a:solidFill>
               </a:rPr>
+              <a:t>Using CGM data…</a:t>
+            </a:r>
+            <a:endParaRPr sz="2100"/>
+          </a:p>
+        </p:txBody>
+      </p:sp>
+      <p:pic>
+        <p:nvPicPr>
+          <p:cNvPr id="98" name="Google Shape;98;p19"/>
+          <p:cNvPicPr preferRelativeResize="0"/>
+          <p:nvPr/>
+        </p:nvPicPr>
+        <p:blipFill>
+          <a:blip r:embed="rId3">
+            <a:alphaModFix/>
+          </a:blip>
+          <a:stretch>
+            <a:fillRect/>
+          </a:stretch>
+        </p:blipFill>
+        <p:spPr>
+          <a:xfrm>
+            <a:off x="304800" y="1394371"/>
+            <a:ext cx="8503921" cy="1785823"/>
+          </a:xfrm>
+          <a:prstGeom prst="rect">
+            <a:avLst/>
+          </a:prstGeom>
+          <a:noFill/>
+          <a:ln>
+            <a:noFill/>
+          </a:ln>
+        </p:spPr>
+      </p:pic>
+      <p:sp>
+        <p:nvSpPr>
+          <p:cNvPr id="99" name="Google Shape;99;p19"/>
+          <p:cNvSpPr txBox="1"/>
+          <p:nvPr/>
+        </p:nvSpPr>
+        <p:spPr>
+          <a:xfrm>
+            <a:off x="311700" y="3702525"/>
+            <a:ext cx="5380500" cy="876000"/>
+          </a:xfrm>
+          <a:prstGeom prst="rect">
+            <a:avLst/>
+          </a:prstGeom>
+          <a:noFill/>
+          <a:ln>
+            <a:noFill/>
+          </a:ln>
+        </p:spPr>
+        <p:txBody>
+          <a:bodyPr anchorCtr="0" anchor="t" bIns="91425" lIns="91425" spcFirstLastPara="1" rIns="91425" wrap="square" tIns="91425">
+            <a:noAutofit/>
+          </a:bodyPr>
+          <a:lstStyle/>
+          <a:p>
+            <a:pPr indent="0" lvl="0" marL="0" rtl="0" algn="l">
+              <a:spcBef>
+                <a:spcPts val="0"/>
+              </a:spcBef>
+              <a:spcAft>
+                <a:spcPts val="0"/>
+              </a:spcAft>
+              <a:buNone/>
+            </a:pPr>
+            <a:r>
+              <a:rPr lang="en" sz="1600">
+                <a:solidFill>
+                  <a:schemeClr val="dk1"/>
+                </a:solidFill>
+                <a:latin typeface="Average"/>
+                <a:ea typeface="Average"/>
+                <a:cs typeface="Average"/>
+                <a:sym typeface="Average"/>
+              </a:rPr>
+              <a:t>CGM: continuous glucose monitor</a:t>
+            </a:r>
+            <a:endParaRPr sz="1600">
+              <a:solidFill>
+                <a:schemeClr val="dk1"/>
+              </a:solidFill>
+              <a:latin typeface="Average"/>
+              <a:ea typeface="Average"/>
+              <a:cs typeface="Average"/>
+              <a:sym typeface="Average"/>
+            </a:endParaRPr>
+          </a:p>
+        </p:txBody>
+      </p:sp>
+    </p:spTree>
+  </p:cSld>
+  <p:clrMapOvr>
+    <a:masterClrMapping/>
+  </p:clrMapOvr>
+</p:sld>
+</file>
+
+<file path=ppt/slides/slide8.xml><?xml version="1.0" encoding="utf-8"?>
+<p:sld xmlns:a="http://schemas.openxmlformats.org/drawingml/2006/main" xmlns:r="http://schemas.openxmlformats.org/officeDocument/2006/relationships" xmlns:mc="http://schemas.openxmlformats.org/markup-compatibility/2006" xmlns:mv="urn:schemas-microsoft-com:mac:vml" xmlns:p="http://schemas.openxmlformats.org/presentationml/2006/main" xmlns:c="http://schemas.openxmlformats.org/drawingml/2006/chart" xmlns:dgm="http://schemas.openxmlformats.org/drawingml/2006/diagram" xmlns:o="urn:schemas-microsoft-com:office:office" xmlns:v="urn:schemas-microsoft-com:vml" xmlns:pvml="urn:schemas-microsoft-com:office:powerpoint" xmlns:com="http://schemas.openxmlformats.org/drawingml/2006/compatibility" xmlns:p14="http://schemas.microsoft.com/office/powerpoint/2010/main" xmlns:p15="http://schemas.microsoft.com/office/powerpoint/2012/main" xmlns:ahyp="http://schemas.microsoft.com/office/drawing/2018/hyperlinkcolor">
+  <p:cSld>
+    <p:spTree>
+      <p:nvGrpSpPr>
+        <p:cNvPr id="103" name="Shape 103"/>
+        <p:cNvGrpSpPr/>
+        <p:nvPr/>
+      </p:nvGrpSpPr>
+      <p:grpSpPr>
+        <a:xfrm>
+          <a:off x="0" y="0"/>
+          <a:ext cx="0" cy="0"/>
+          <a:chOff x="0" y="0"/>
+          <a:chExt cx="0" cy="0"/>
+        </a:xfrm>
+      </p:grpSpPr>
+      <p:sp>
+        <p:nvSpPr>
+          <p:cNvPr id="104" name="Google Shape;104;p20"/>
+          <p:cNvSpPr txBox="1"/>
+          <p:nvPr>
+            <p:ph type="title"/>
+          </p:nvPr>
+        </p:nvSpPr>
+        <p:spPr>
+          <a:xfrm>
+            <a:off x="311700" y="445025"/>
+            <a:ext cx="8520600" cy="572700"/>
+          </a:xfrm>
+          <a:prstGeom prst="rect">
+            <a:avLst/>
+          </a:prstGeom>
+        </p:spPr>
+        <p:txBody>
+          <a:bodyPr anchorCtr="0" anchor="t" bIns="91425" lIns="91425" spcFirstLastPara="1" rIns="91425" wrap="square" tIns="91425">
+            <a:normAutofit/>
+          </a:bodyPr>
+          <a:lstStyle/>
+          <a:p>
+            <a:pPr indent="0" lvl="0" marL="0" rtl="0" algn="l">
+              <a:spcBef>
+                <a:spcPts val="0"/>
+              </a:spcBef>
+              <a:spcAft>
+                <a:spcPts val="0"/>
+              </a:spcAft>
+              <a:buNone/>
+            </a:pPr>
+            <a:r>
+              <a:rPr lang="en" sz="2100">
+                <a:solidFill>
+                  <a:schemeClr val="accent3"/>
+                </a:solidFill>
+              </a:rPr>
               <a:t>… requires connecting the dots.</a:t>
             </a:r>
             <a:endParaRPr sz="2100"/>
@@ -9237,7 +9539,7 @@
       </p:sp>
       <p:sp>
         <p:nvSpPr>
-          <p:cNvPr id="99" name="Google Shape;99;p19"/>
+          <p:cNvPr id="105" name="Google Shape;105;p20"/>
           <p:cNvSpPr txBox="1"/>
           <p:nvPr>
             <p:ph idx="1" type="body"/>
@@ -9371,7 +9673,7 @@
       </p:sp>
       <p:pic>
         <p:nvPicPr>
-          <p:cNvPr id="100" name="Google Shape;100;p19"/>
+          <p:cNvPr id="106" name="Google Shape;106;p20"/>
           <p:cNvPicPr preferRelativeResize="0"/>
           <p:nvPr/>
         </p:nvPicPr>
@@ -9399,7 +9701,7 @@
       </p:pic>
       <p:pic>
         <p:nvPicPr>
-          <p:cNvPr id="101" name="Google Shape;101;p19"/>
+          <p:cNvPr id="107" name="Google Shape;107;p20"/>
           <p:cNvPicPr preferRelativeResize="0"/>
           <p:nvPr/>
         </p:nvPicPr>
@@ -9433,12 +9735,12 @@
 </p:sld>
 </file>
 
-<file path=ppt/slides/slide8.xml><?xml version="1.0" encoding="utf-8"?>
+<file path=ppt/slides/slide9.xml><?xml version="1.0" encoding="utf-8"?>
 <p:sld xmlns:a="http://schemas.openxmlformats.org/drawingml/2006/main" xmlns:r="http://schemas.openxmlformats.org/officeDocument/2006/relationships" xmlns:mc="http://schemas.openxmlformats.org/markup-compatibility/2006" xmlns:mv="urn:schemas-microsoft-com:mac:vml" xmlns:p="http://schemas.openxmlformats.org/presentationml/2006/main" xmlns:c="http://schemas.openxmlformats.org/drawingml/2006/chart" xmlns:dgm="http://schemas.openxmlformats.org/drawingml/2006/diagram" xmlns:o="urn:schemas-microsoft-com:office:office" xmlns:v="urn:schemas-microsoft-com:vml" xmlns:pvml="urn:schemas-microsoft-com:office:powerpoint" xmlns:com="http://schemas.openxmlformats.org/drawingml/2006/compatibility" xmlns:p14="http://schemas.microsoft.com/office/powerpoint/2010/main" xmlns:p15="http://schemas.microsoft.com/office/powerpoint/2012/main" xmlns:ahyp="http://schemas.microsoft.com/office/drawing/2018/hyperlinkcolor">
   <p:cSld>
     <p:spTree>
       <p:nvGrpSpPr>
-        <p:cNvPr id="105" name="Shape 105"/>
+        <p:cNvPr id="111" name="Shape 111"/>
         <p:cNvGrpSpPr/>
         <p:nvPr/>
       </p:nvGrpSpPr>
@@ -9452,7 +9754,7 @@
       </p:grpSpPr>
       <p:sp>
         <p:nvSpPr>
-          <p:cNvPr id="106" name="Google Shape;106;p20"/>
+          <p:cNvPr id="112" name="Google Shape;112;p21"/>
           <p:cNvSpPr txBox="1"/>
           <p:nvPr>
             <p:ph type="title"/>
@@ -9496,7 +9798,7 @@
       </p:sp>
       <p:pic>
         <p:nvPicPr>
-          <p:cNvPr id="107" name="Google Shape;107;p20"/>
+          <p:cNvPr id="113" name="Google Shape;113;p21"/>
           <p:cNvPicPr preferRelativeResize="0"/>
           <p:nvPr/>
         </p:nvPicPr>
@@ -9510,8 +9812,8 @@
         </p:blipFill>
         <p:spPr>
           <a:xfrm>
-            <a:off x="692700" y="1271774"/>
-            <a:ext cx="7713623" cy="3047026"/>
+            <a:off x="311700" y="1195574"/>
+            <a:ext cx="8503921" cy="3344875"/>
           </a:xfrm>
           <a:prstGeom prst="rect">
             <a:avLst/>
@@ -9524,13 +9826,13 @@
       </p:pic>
       <p:sp>
         <p:nvSpPr>
-          <p:cNvPr id="108" name="Google Shape;108;p20"/>
+          <p:cNvPr id="114" name="Google Shape;114;p21"/>
           <p:cNvSpPr txBox="1"/>
           <p:nvPr/>
         </p:nvSpPr>
         <p:spPr>
           <a:xfrm>
-            <a:off x="491325" y="4497000"/>
+            <a:off x="415125" y="4497000"/>
             <a:ext cx="4980600" cy="263700"/>
           </a:xfrm>
           <a:prstGeom prst="rect">
@@ -9611,112 +9913,286 @@
 </p:sld>
 </file>
 
-<file path=ppt/slides/slide9.xml><?xml version="1.0" encoding="utf-8"?>
-<p:sld xmlns:a="http://schemas.openxmlformats.org/drawingml/2006/main" xmlns:r="http://schemas.openxmlformats.org/officeDocument/2006/relationships" xmlns:mc="http://schemas.openxmlformats.org/markup-compatibility/2006" xmlns:mv="urn:schemas-microsoft-com:mac:vml" xmlns:p="http://schemas.openxmlformats.org/presentationml/2006/main" xmlns:c="http://schemas.openxmlformats.org/drawingml/2006/chart" xmlns:dgm="http://schemas.openxmlformats.org/drawingml/2006/diagram" xmlns:o="urn:schemas-microsoft-com:office:office" xmlns:v="urn:schemas-microsoft-com:vml" xmlns:pvml="urn:schemas-microsoft-com:office:powerpoint" xmlns:com="http://schemas.openxmlformats.org/drawingml/2006/compatibility" xmlns:p14="http://schemas.microsoft.com/office/powerpoint/2010/main" xmlns:p15="http://schemas.microsoft.com/office/powerpoint/2012/main" xmlns:ahyp="http://schemas.microsoft.com/office/drawing/2018/hyperlinkcolor">
-  <p:cSld>
-    <p:spTree>
-      <p:nvGrpSpPr>
-        <p:cNvPr id="112" name="Shape 112"/>
-        <p:cNvGrpSpPr/>
-        <p:nvPr/>
-      </p:nvGrpSpPr>
-      <p:grpSpPr>
-        <a:xfrm>
-          <a:off x="0" y="0"/>
-          <a:ext cx="0" cy="0"/>
-          <a:chOff x="0" y="0"/>
-          <a:chExt cx="0" cy="0"/>
-        </a:xfrm>
-      </p:grpSpPr>
-      <p:sp>
-        <p:nvSpPr>
-          <p:cNvPr id="113" name="Google Shape;113;p21"/>
-          <p:cNvSpPr txBox="1"/>
-          <p:nvPr>
-            <p:ph type="title"/>
-          </p:nvPr>
-        </p:nvSpPr>
-        <p:spPr>
-          <a:xfrm>
-            <a:off x="311700" y="445025"/>
-            <a:ext cx="8520600" cy="572700"/>
-          </a:xfrm>
-          <a:prstGeom prst="rect">
-            <a:avLst/>
-          </a:prstGeom>
-        </p:spPr>
-        <p:txBody>
-          <a:bodyPr anchorCtr="0" anchor="t" bIns="91425" lIns="91425" spcFirstLastPara="1" rIns="91425" wrap="square" tIns="91425">
-            <a:normAutofit/>
-          </a:bodyPr>
-          <a:lstStyle/>
-          <a:p>
-            <a:pPr indent="0" lvl="0" marL="0" rtl="0" algn="l">
-              <a:spcBef>
-                <a:spcPts val="0"/>
-              </a:spcBef>
-              <a:spcAft>
-                <a:spcPts val="0"/>
-              </a:spcAft>
-              <a:buNone/>
-            </a:pPr>
-            <a:r>
-              <a:rPr lang="en" sz="2100">
-                <a:solidFill>
-                  <a:schemeClr val="accent3"/>
-                </a:solidFill>
-              </a:rPr>
-              <a:t>.. and used to fit a SARIMAX (2, 1, 1) </a:t>
-            </a:r>
-            <a:r>
-              <a:rPr lang="en" sz="2100">
-                <a:solidFill>
-                  <a:schemeClr val="accent3"/>
-                </a:solidFill>
-              </a:rPr>
-              <a:t>model with 3 covariates. </a:t>
-            </a:r>
-            <a:endParaRPr sz="2100"/>
-          </a:p>
-        </p:txBody>
-      </p:sp>
-      <p:pic>
-        <p:nvPicPr>
-          <p:cNvPr id="114" name="Google Shape;114;p21"/>
-          <p:cNvPicPr preferRelativeResize="0"/>
-          <p:nvPr/>
-        </p:nvPicPr>
-        <p:blipFill>
-          <a:blip r:embed="rId3">
-            <a:alphaModFix/>
-          </a:blip>
-          <a:stretch>
-            <a:fillRect/>
-          </a:stretch>
-        </p:blipFill>
-        <p:spPr>
-          <a:xfrm>
-            <a:off x="152400" y="1170125"/>
-            <a:ext cx="8839204" cy="2973736"/>
-          </a:xfrm>
-          <a:prstGeom prst="rect">
-            <a:avLst/>
-          </a:prstGeom>
-          <a:noFill/>
-          <a:ln>
-            <a:noFill/>
-          </a:ln>
-        </p:spPr>
-      </p:pic>
-    </p:spTree>
-  </p:cSld>
-  <p:clrMapOvr>
-    <a:masterClrMapping/>
-  </p:clrMapOvr>
-</p:sld>
+<file path=ppt/theme/theme1.xml><?xml version="1.0" encoding="utf-8"?>
+<a:theme xmlns:a="http://schemas.openxmlformats.org/drawingml/2006/main" xmlns:r="http://schemas.openxmlformats.org/officeDocument/2006/relationships">
+  <a:themeElements>
+    <a:clrScheme name="Default">
+      <a:dk1>
+        <a:srgbClr val="000000"/>
+      </a:dk1>
+      <a:lt1>
+        <a:srgbClr val="FFFFFF"/>
+      </a:lt1>
+      <a:dk2>
+        <a:srgbClr val="158158"/>
+      </a:dk2>
+      <a:lt2>
+        <a:srgbClr val="F3F3F3"/>
+      </a:lt2>
+      <a:accent1>
+        <a:srgbClr val="058DC7"/>
+      </a:accent1>
+      <a:accent2>
+        <a:srgbClr val="50B432"/>
+      </a:accent2>
+      <a:accent3>
+        <a:srgbClr val="ED561B"/>
+      </a:accent3>
+      <a:accent4>
+        <a:srgbClr val="EDEF00"/>
+      </a:accent4>
+      <a:accent5>
+        <a:srgbClr val="24CBE5"/>
+      </a:accent5>
+      <a:accent6>
+        <a:srgbClr val="64E572"/>
+      </a:accent6>
+      <a:hlink>
+        <a:srgbClr val="2200CC"/>
+      </a:hlink>
+      <a:folHlink>
+        <a:srgbClr val="551A8B"/>
+      </a:folHlink>
+    </a:clrScheme>
+    <a:fontScheme name="Office">
+      <a:majorFont>
+        <a:latin typeface="Arial"/>
+        <a:ea typeface=""/>
+        <a:cs typeface=""/>
+        <a:font script="Jpan" typeface="ＭＳ Ｐゴシック"/>
+        <a:font script="Hang" typeface="맑은 고딕"/>
+        <a:font script="Hans" typeface="宋体"/>
+        <a:font script="Hant" typeface="新細明體"/>
+        <a:font script="Arab" typeface="Times New Roman"/>
+        <a:font script="Hebr" typeface="Times New Roman"/>
+        <a:font script="Thai" typeface="Angsana New"/>
+        <a:font script="Ethi" typeface="Nyala"/>
+        <a:font script="Beng" typeface="Vrinda"/>
+        <a:font script="Gujr" typeface="Shruti"/>
+        <a:font script="Khmr" typeface="MoolBoran"/>
+        <a:font script="Knda" typeface="Tunga"/>
+        <a:font script="Guru" typeface="Raavi"/>
+        <a:font script="Cans" typeface="Euphemia"/>
+        <a:font script="Cher" typeface="Plantagenet Cherokee"/>
+        <a:font script="Yiii" typeface="Microsoft Yi Baiti"/>
+        <a:font script="Tibt" typeface="Microsoft Himalaya"/>
+        <a:font script="Thaa" typeface="MV Boli"/>
+        <a:font script="Deva" typeface="Mangal"/>
+        <a:font script="Telu" typeface="Gautami"/>
+        <a:font script="Taml" typeface="Latha"/>
+        <a:font script="Syrc" typeface="Estrangelo Edessa"/>
+        <a:font script="Orya" typeface="Kalinga"/>
+        <a:font script="Mlym" typeface="Kartika"/>
+        <a:font script="Laoo" typeface="DokChampa"/>
+        <a:font script="Sinh" typeface="Iskoola Pota"/>
+        <a:font script="Mong" typeface="Mongolian Baiti"/>
+        <a:font script="Viet" typeface="Times New Roman"/>
+        <a:font script="Uigh" typeface="Microsoft Uighur"/>
+        <a:font script="Geor" typeface="Sylfaen"/>
+      </a:majorFont>
+      <a:minorFont>
+        <a:latin typeface="Arial"/>
+        <a:ea typeface=""/>
+        <a:cs typeface=""/>
+        <a:font script="Jpan" typeface="ＭＳ Ｐゴシック"/>
+        <a:font script="Hang" typeface="맑은 고딕"/>
+        <a:font script="Hans" typeface="宋体"/>
+        <a:font script="Hant" typeface="新細明體"/>
+        <a:font script="Arab" typeface="Arial"/>
+        <a:font script="Hebr" typeface="Arial"/>
+        <a:font script="Thai" typeface="Cordia New"/>
+        <a:font script="Ethi" typeface="Nyala"/>
+        <a:font script="Beng" typeface="Vrinda"/>
+        <a:font script="Gujr" typeface="Shruti"/>
+        <a:font script="Khmr" typeface="DaunPenh"/>
+        <a:font script="Knda" typeface="Tunga"/>
+        <a:font script="Guru" typeface="Raavi"/>
+        <a:font script="Cans" typeface="Euphemia"/>
+        <a:font script="Cher" typeface="Plantagenet Cherokee"/>
+        <a:font script="Yiii" typeface="Microsoft Yi Baiti"/>
+        <a:font script="Tibt" typeface="Microsoft Himalaya"/>
+        <a:font script="Thaa" typeface="MV Boli"/>
+        <a:font script="Deva" typeface="Mangal"/>
+        <a:font script="Telu" typeface="Gautami"/>
+        <a:font script="Taml" typeface="Latha"/>
+        <a:font script="Syrc" typeface="Estrangelo Edessa"/>
+        <a:font script="Orya" typeface="Kalinga"/>
+        <a:font script="Mlym" typeface="Kartika"/>
+        <a:font script="Laoo" typeface="DokChampa"/>
+        <a:font script="Sinh" typeface="Iskoola Pota"/>
+        <a:font script="Mong" typeface="Mongolian Baiti"/>
+        <a:font script="Viet" typeface="Arial"/>
+        <a:font script="Uigh" typeface="Microsoft Uighur"/>
+        <a:font script="Geor" typeface="Sylfaen"/>
+      </a:minorFont>
+    </a:fontScheme>
+    <a:fmtScheme name="Office">
+      <a:fillStyleLst>
+        <a:solidFill>
+          <a:schemeClr val="phClr"/>
+        </a:solidFill>
+        <a:gradFill rotWithShape="1">
+          <a:gsLst>
+            <a:gs pos="0">
+              <a:schemeClr val="phClr">
+                <a:tint val="50000"/>
+                <a:satMod val="300000"/>
+              </a:schemeClr>
+            </a:gs>
+            <a:gs pos="35000">
+              <a:schemeClr val="phClr">
+                <a:tint val="37000"/>
+                <a:satMod val="300000"/>
+              </a:schemeClr>
+            </a:gs>
+            <a:gs pos="100000">
+              <a:schemeClr val="phClr">
+                <a:tint val="15000"/>
+                <a:satMod val="350000"/>
+              </a:schemeClr>
+            </a:gs>
+          </a:gsLst>
+          <a:lin ang="16200000" scaled="1"/>
+        </a:gradFill>
+        <a:gradFill rotWithShape="1">
+          <a:gsLst>
+            <a:gs pos="0">
+              <a:schemeClr val="phClr">
+                <a:tint val="100000"/>
+                <a:shade val="100000"/>
+                <a:satMod val="130000"/>
+              </a:schemeClr>
+            </a:gs>
+            <a:gs pos="100000">
+              <a:schemeClr val="phClr">
+                <a:tint val="50000"/>
+                <a:shade val="100000"/>
+                <a:satMod val="350000"/>
+              </a:schemeClr>
+            </a:gs>
+          </a:gsLst>
+          <a:lin ang="16200000" scaled="0"/>
+        </a:gradFill>
+      </a:fillStyleLst>
+      <a:lnStyleLst>
+        <a:ln w="9525" cap="flat" cmpd="sng" algn="ctr">
+          <a:solidFill>
+            <a:schemeClr val="phClr">
+              <a:shade val="95000"/>
+              <a:satMod val="105000"/>
+            </a:schemeClr>
+          </a:solidFill>
+          <a:prstDash val="solid"/>
+        </a:ln>
+        <a:ln w="25400" cap="flat" cmpd="sng" algn="ctr">
+          <a:solidFill>
+            <a:schemeClr val="phClr"/>
+          </a:solidFill>
+          <a:prstDash val="solid"/>
+        </a:ln>
+        <a:ln w="38100" cap="flat" cmpd="sng" algn="ctr">
+          <a:solidFill>
+            <a:schemeClr val="phClr"/>
+          </a:solidFill>
+          <a:prstDash val="solid"/>
+        </a:ln>
+      </a:lnStyleLst>
+      <a:effectStyleLst>
+        <a:effectStyle>
+          <a:effectLst>
+            <a:outerShdw blurRad="40000" dist="20000" dir="5400000" rotWithShape="0">
+              <a:srgbClr val="000000">
+                <a:alpha val="38000"/>
+              </a:srgbClr>
+            </a:outerShdw>
+          </a:effectLst>
+        </a:effectStyle>
+        <a:effectStyle>
+          <a:effectLst>
+            <a:outerShdw blurRad="40000" dist="23000" dir="5400000" rotWithShape="0">
+              <a:srgbClr val="000000">
+                <a:alpha val="35000"/>
+              </a:srgbClr>
+            </a:outerShdw>
+          </a:effectLst>
+        </a:effectStyle>
+        <a:effectStyle>
+          <a:effectLst>
+            <a:outerShdw blurRad="40000" dist="23000" dir="5400000" rotWithShape="0">
+              <a:srgbClr val="000000">
+                <a:alpha val="35000"/>
+              </a:srgbClr>
+            </a:outerShdw>
+          </a:effectLst>
+          <a:scene3d>
+            <a:camera prst="orthographicFront">
+              <a:rot lat="0" lon="0" rev="0"/>
+            </a:camera>
+            <a:lightRig rig="threePt" dir="t">
+              <a:rot lat="0" lon="0" rev="1200000"/>
+            </a:lightRig>
+          </a:scene3d>
+          <a:sp3d>
+            <a:bevelT w="63500" h="25400"/>
+          </a:sp3d>
+        </a:effectStyle>
+      </a:effectStyleLst>
+      <a:bgFillStyleLst>
+        <a:solidFill>
+          <a:schemeClr val="phClr"/>
+        </a:solidFill>
+        <a:gradFill rotWithShape="1">
+          <a:gsLst>
+            <a:gs pos="0">
+              <a:schemeClr val="phClr">
+                <a:tint val="40000"/>
+                <a:satMod val="350000"/>
+              </a:schemeClr>
+            </a:gs>
+            <a:gs pos="40000">
+              <a:schemeClr val="phClr">
+                <a:tint val="45000"/>
+                <a:shade val="99000"/>
+                <a:satMod val="350000"/>
+              </a:schemeClr>
+            </a:gs>
+            <a:gs pos="100000">
+              <a:schemeClr val="phClr">
+                <a:shade val="20000"/>
+                <a:satMod val="255000"/>
+              </a:schemeClr>
+            </a:gs>
+          </a:gsLst>
+          <a:path path="circle">
+            <a:fillToRect l="50000" t="-80000" r="50000" b="180000"/>
+          </a:path>
+        </a:gradFill>
+        <a:gradFill rotWithShape="1">
+          <a:gsLst>
+            <a:gs pos="0">
+              <a:schemeClr val="phClr">
+                <a:tint val="80000"/>
+                <a:satMod val="300000"/>
+              </a:schemeClr>
+            </a:gs>
+            <a:gs pos="100000">
+              <a:schemeClr val="phClr">
+                <a:shade val="30000"/>
+                <a:satMod val="200000"/>
+              </a:schemeClr>
+            </a:gs>
+          </a:gsLst>
+          <a:path path="circle">
+            <a:fillToRect l="50000" t="50000" r="50000" b="50000"/>
+          </a:path>
+        </a:gradFill>
+      </a:bgFillStyleLst>
+    </a:fmtScheme>
+  </a:themeElements>
+</a:theme>
 </file>
 
-<file path=ppt/theme/theme1.xml><?xml version="1.0" encoding="utf-8"?>
+<file path=ppt/theme/theme2.xml><?xml version="1.0" encoding="utf-8"?>
 <a:theme xmlns:a="http://schemas.openxmlformats.org/drawingml/2006/main" xmlns:r="http://schemas.openxmlformats.org/officeDocument/2006/relationships" name="Slate">
   <a:themeElements>
     <a:clrScheme name="Slate">
@@ -9993,283 +10469,4 @@
     </a:fmtScheme>
   </a:themeElements>
 </a:theme>
-</file>
-
-<file path=ppt/theme/theme2.xml><?xml version="1.0" encoding="utf-8"?>
-<a:theme xmlns:a="http://schemas.openxmlformats.org/drawingml/2006/main" xmlns:r="http://schemas.openxmlformats.org/officeDocument/2006/relationships">
-  <a:themeElements>
-    <a:clrScheme name="Default">
-      <a:dk1>
-        <a:srgbClr val="000000"/>
-      </a:dk1>
-      <a:lt1>
-        <a:srgbClr val="FFFFFF"/>
-      </a:lt1>
-      <a:dk2>
-        <a:srgbClr val="158158"/>
-      </a:dk2>
-      <a:lt2>
-        <a:srgbClr val="F3F3F3"/>
-      </a:lt2>
-      <a:accent1>
-        <a:srgbClr val="058DC7"/>
-      </a:accent1>
-      <a:accent2>
-        <a:srgbClr val="50B432"/>
-      </a:accent2>
-      <a:accent3>
-        <a:srgbClr val="ED561B"/>
-      </a:accent3>
-      <a:accent4>
-        <a:srgbClr val="EDEF00"/>
-      </a:accent4>
-      <a:accent5>
-        <a:srgbClr val="24CBE5"/>
-      </a:accent5>
-      <a:accent6>
-        <a:srgbClr val="64E572"/>
-      </a:accent6>
-      <a:hlink>
-        <a:srgbClr val="2200CC"/>
-      </a:hlink>
-      <a:folHlink>
-        <a:srgbClr val="551A8B"/>
-      </a:folHlink>
-    </a:clrScheme>
-    <a:fontScheme name="Office">
-      <a:majorFont>
-        <a:latin typeface="Arial"/>
-        <a:ea typeface=""/>
-        <a:cs typeface=""/>
-        <a:font script="Jpan" typeface="ＭＳ Ｐゴシック"/>
-        <a:font script="Hang" typeface="맑은 고딕"/>
-        <a:font script="Hans" typeface="宋体"/>
-        <a:font script="Hant" typeface="新細明體"/>
-        <a:font script="Arab" typeface="Times New Roman"/>
-        <a:font script="Hebr" typeface="Times New Roman"/>
-        <a:font script="Thai" typeface="Angsana New"/>
-        <a:font script="Ethi" typeface="Nyala"/>
-        <a:font script="Beng" typeface="Vrinda"/>
-        <a:font script="Gujr" typeface="Shruti"/>
-        <a:font script="Khmr" typeface="MoolBoran"/>
-        <a:font script="Knda" typeface="Tunga"/>
-        <a:font script="Guru" typeface="Raavi"/>
-        <a:font script="Cans" typeface="Euphemia"/>
-        <a:font script="Cher" typeface="Plantagenet Cherokee"/>
-        <a:font script="Yiii" typeface="Microsoft Yi Baiti"/>
-        <a:font script="Tibt" typeface="Microsoft Himalaya"/>
-        <a:font script="Thaa" typeface="MV Boli"/>
-        <a:font script="Deva" typeface="Mangal"/>
-        <a:font script="Telu" typeface="Gautami"/>
-        <a:font script="Taml" typeface="Latha"/>
-        <a:font script="Syrc" typeface="Estrangelo Edessa"/>
-        <a:font script="Orya" typeface="Kalinga"/>
-        <a:font script="Mlym" typeface="Kartika"/>
-        <a:font script="Laoo" typeface="DokChampa"/>
-        <a:font script="Sinh" typeface="Iskoola Pota"/>
-        <a:font script="Mong" typeface="Mongolian Baiti"/>
-        <a:font script="Viet" typeface="Times New Roman"/>
-        <a:font script="Uigh" typeface="Microsoft Uighur"/>
-        <a:font script="Geor" typeface="Sylfaen"/>
-      </a:majorFont>
-      <a:minorFont>
-        <a:latin typeface="Arial"/>
-        <a:ea typeface=""/>
-        <a:cs typeface=""/>
-        <a:font script="Jpan" typeface="ＭＳ Ｐゴシック"/>
-        <a:font script="Hang" typeface="맑은 고딕"/>
-        <a:font script="Hans" typeface="宋体"/>
-        <a:font script="Hant" typeface="新細明體"/>
-        <a:font script="Arab" typeface="Arial"/>
-        <a:font script="Hebr" typeface="Arial"/>
-        <a:font script="Thai" typeface="Cordia New"/>
-        <a:font script="Ethi" typeface="Nyala"/>
-        <a:font script="Beng" typeface="Vrinda"/>
-        <a:font script="Gujr" typeface="Shruti"/>
-        <a:font script="Khmr" typeface="DaunPenh"/>
-        <a:font script="Knda" typeface="Tunga"/>
-        <a:font script="Guru" typeface="Raavi"/>
-        <a:font script="Cans" typeface="Euphemia"/>
-        <a:font script="Cher" typeface="Plantagenet Cherokee"/>
-        <a:font script="Yiii" typeface="Microsoft Yi Baiti"/>
-        <a:font script="Tibt" typeface="Microsoft Himalaya"/>
-        <a:font script="Thaa" typeface="MV Boli"/>
-        <a:font script="Deva" typeface="Mangal"/>
-        <a:font script="Telu" typeface="Gautami"/>
-        <a:font script="Taml" typeface="Latha"/>
-        <a:font script="Syrc" typeface="Estrangelo Edessa"/>
-        <a:font script="Orya" typeface="Kalinga"/>
-        <a:font script="Mlym" typeface="Kartika"/>
-        <a:font script="Laoo" typeface="DokChampa"/>
-        <a:font script="Sinh" typeface="Iskoola Pota"/>
-        <a:font script="Mong" typeface="Mongolian Baiti"/>
-        <a:font script="Viet" typeface="Arial"/>
-        <a:font script="Uigh" typeface="Microsoft Uighur"/>
-        <a:font script="Geor" typeface="Sylfaen"/>
-      </a:minorFont>
-    </a:fontScheme>
-    <a:fmtScheme name="Office">
-      <a:fillStyleLst>
-        <a:solidFill>
-          <a:schemeClr val="phClr"/>
-        </a:solidFill>
-        <a:gradFill rotWithShape="1">
-          <a:gsLst>
-            <a:gs pos="0">
-              <a:schemeClr val="phClr">
-                <a:tint val="50000"/>
-                <a:satMod val="300000"/>
-              </a:schemeClr>
-            </a:gs>
-            <a:gs pos="35000">
-              <a:schemeClr val="phClr">
-                <a:tint val="37000"/>
-                <a:satMod val="300000"/>
-              </a:schemeClr>
-            </a:gs>
-            <a:gs pos="100000">
-              <a:schemeClr val="phClr">
-                <a:tint val="15000"/>
-                <a:satMod val="350000"/>
-              </a:schemeClr>
-            </a:gs>
-          </a:gsLst>
-          <a:lin ang="16200000" scaled="1"/>
-        </a:gradFill>
-        <a:gradFill rotWithShape="1">
-          <a:gsLst>
-            <a:gs pos="0">
-              <a:schemeClr val="phClr">
-                <a:tint val="100000"/>
-                <a:shade val="100000"/>
-                <a:satMod val="130000"/>
-              </a:schemeClr>
-            </a:gs>
-            <a:gs pos="100000">
-              <a:schemeClr val="phClr">
-                <a:tint val="50000"/>
-                <a:shade val="100000"/>
-                <a:satMod val="350000"/>
-              </a:schemeClr>
-            </a:gs>
-          </a:gsLst>
-          <a:lin ang="16200000" scaled="0"/>
-        </a:gradFill>
-      </a:fillStyleLst>
-      <a:lnStyleLst>
-        <a:ln w="9525" cap="flat" cmpd="sng" algn="ctr">
-          <a:solidFill>
-            <a:schemeClr val="phClr">
-              <a:shade val="95000"/>
-              <a:satMod val="105000"/>
-            </a:schemeClr>
-          </a:solidFill>
-          <a:prstDash val="solid"/>
-        </a:ln>
-        <a:ln w="25400" cap="flat" cmpd="sng" algn="ctr">
-          <a:solidFill>
-            <a:schemeClr val="phClr"/>
-          </a:solidFill>
-          <a:prstDash val="solid"/>
-        </a:ln>
-        <a:ln w="38100" cap="flat" cmpd="sng" algn="ctr">
-          <a:solidFill>
-            <a:schemeClr val="phClr"/>
-          </a:solidFill>
-          <a:prstDash val="solid"/>
-        </a:ln>
-      </a:lnStyleLst>
-      <a:effectStyleLst>
-        <a:effectStyle>
-          <a:effectLst>
-            <a:outerShdw blurRad="40000" dist="20000" dir="5400000" rotWithShape="0">
-              <a:srgbClr val="000000">
-                <a:alpha val="38000"/>
-              </a:srgbClr>
-            </a:outerShdw>
-          </a:effectLst>
-        </a:effectStyle>
-        <a:effectStyle>
-          <a:effectLst>
-            <a:outerShdw blurRad="40000" dist="23000" dir="5400000" rotWithShape="0">
-              <a:srgbClr val="000000">
-                <a:alpha val="35000"/>
-              </a:srgbClr>
-            </a:outerShdw>
-          </a:effectLst>
-        </a:effectStyle>
-        <a:effectStyle>
-          <a:effectLst>
-            <a:outerShdw blurRad="40000" dist="23000" dir="5400000" rotWithShape="0">
-              <a:srgbClr val="000000">
-                <a:alpha val="35000"/>
-              </a:srgbClr>
-            </a:outerShdw>
-          </a:effectLst>
-          <a:scene3d>
-            <a:camera prst="orthographicFront">
-              <a:rot lat="0" lon="0" rev="0"/>
-            </a:camera>
-            <a:lightRig rig="threePt" dir="t">
-              <a:rot lat="0" lon="0" rev="1200000"/>
-            </a:lightRig>
-          </a:scene3d>
-          <a:sp3d>
-            <a:bevelT w="63500" h="25400"/>
-          </a:sp3d>
-        </a:effectStyle>
-      </a:effectStyleLst>
-      <a:bgFillStyleLst>
-        <a:solidFill>
-          <a:schemeClr val="phClr"/>
-        </a:solidFill>
-        <a:gradFill rotWithShape="1">
-          <a:gsLst>
-            <a:gs pos="0">
-              <a:schemeClr val="phClr">
-                <a:tint val="40000"/>
-                <a:satMod val="350000"/>
-              </a:schemeClr>
-            </a:gs>
-            <a:gs pos="40000">
-              <a:schemeClr val="phClr">
-                <a:tint val="45000"/>
-                <a:shade val="99000"/>
-                <a:satMod val="350000"/>
-              </a:schemeClr>
-            </a:gs>
-            <a:gs pos="100000">
-              <a:schemeClr val="phClr">
-                <a:shade val="20000"/>
-                <a:satMod val="255000"/>
-              </a:schemeClr>
-            </a:gs>
-          </a:gsLst>
-          <a:path path="circle">
-            <a:fillToRect l="50000" t="-80000" r="50000" b="180000"/>
-          </a:path>
-        </a:gradFill>
-        <a:gradFill rotWithShape="1">
-          <a:gsLst>
-            <a:gs pos="0">
-              <a:schemeClr val="phClr">
-                <a:tint val="80000"/>
-                <a:satMod val="300000"/>
-              </a:schemeClr>
-            </a:gs>
-            <a:gs pos="100000">
-              <a:schemeClr val="phClr">
-                <a:shade val="30000"/>
-                <a:satMod val="200000"/>
-              </a:schemeClr>
-            </a:gs>
-          </a:gsLst>
-          <a:path path="circle">
-            <a:fillToRect l="50000" t="50000" r="50000" b="50000"/>
-          </a:path>
-        </a:gradFill>
-      </a:bgFillStyleLst>
-    </a:fmtScheme>
-  </a:themeElements>
-</a:theme>
 </file>
</xml_diff>